<commit_message>
opt slides font changed
</commit_message>
<xml_diff>
--- a/assets/ppt/opt/opt.pptx
+++ b/assets/ppt/opt/opt.pptx
@@ -223,7 +223,9 @@
             </a:lvl1pPr>
           </a:lstStyle>
           <a:p>
-            <a:endParaRPr lang="en-US"/>
+            <a:endParaRPr lang="en-US" dirty="0">
+              <a:latin typeface="Calibri"/>
+            </a:endParaRPr>
           </a:p>
         </p:txBody>
       </p:sp>
@@ -255,11 +257,15 @@
           </a:lstStyle>
           <a:p>
             <a:fld id="{2A2B9AA4-819F-8549-A06A-E1B5D9D61F62}" type="datetimeFigureOut">
-              <a:rPr lang="en-US" smtClean="0"/>
+              <a:rPr lang="en-US" smtClean="0">
+                <a:latin typeface="Calibri"/>
+              </a:rPr>
               <a:pPr/>
-              <a:t>16-07-19</a:t>
+              <a:t>16-07-26</a:t>
             </a:fld>
-            <a:endParaRPr lang="en-US"/>
+            <a:endParaRPr lang="en-US" dirty="0">
+              <a:latin typeface="Calibri"/>
+            </a:endParaRPr>
           </a:p>
         </p:txBody>
       </p:sp>
@@ -290,7 +296,9 @@
             </a:lvl1pPr>
           </a:lstStyle>
           <a:p>
-            <a:endParaRPr lang="en-US"/>
+            <a:endParaRPr lang="en-US" dirty="0">
+              <a:latin typeface="Calibri"/>
+            </a:endParaRPr>
           </a:p>
         </p:txBody>
       </p:sp>
@@ -322,11 +330,15 @@
           </a:lstStyle>
           <a:p>
             <a:fld id="{0B684A22-EC9B-6348-9969-97C239B2C593}" type="slidenum">
-              <a:rPr lang="en-US" smtClean="0"/>
+              <a:rPr lang="en-US" smtClean="0">
+                <a:latin typeface="Calibri"/>
+              </a:rPr>
               <a:pPr/>
               <a:t>‹#›</a:t>
             </a:fld>
-            <a:endParaRPr lang="en-US"/>
+            <a:endParaRPr lang="en-US" dirty="0">
+              <a:latin typeface="Calibri"/>
+            </a:endParaRPr>
           </a:p>
         </p:txBody>
       </p:sp>
@@ -402,11 +414,13 @@
           </a:bodyPr>
           <a:lstStyle>
             <a:lvl1pPr>
-              <a:defRPr sz="1200"/>
+              <a:defRPr sz="1200">
+                <a:latin typeface="Calibri"/>
+              </a:defRPr>
             </a:lvl1pPr>
           </a:lstStyle>
           <a:p>
-            <a:endParaRPr lang="en-US"/>
+            <a:endParaRPr lang="en-US" dirty="0"/>
           </a:p>
         </p:txBody>
       </p:sp>
@@ -445,11 +459,13 @@
           </a:bodyPr>
           <a:lstStyle>
             <a:lvl1pPr algn="r">
-              <a:defRPr sz="1200"/>
+              <a:defRPr sz="1200">
+                <a:latin typeface="Calibri"/>
+              </a:defRPr>
             </a:lvl1pPr>
           </a:lstStyle>
           <a:p>
-            <a:endParaRPr lang="en-US"/>
+            <a:endParaRPr lang="en-US" dirty="0"/>
           </a:p>
         </p:txBody>
       </p:sp>
@@ -520,35 +536,35 @@
           <a:p>
             <a:pPr lvl="0"/>
             <a:r>
-              <a:rPr lang="en-US"/>
+              <a:rPr lang="en-US" dirty="0"/>
               <a:t>Click to edit Master text styles</a:t>
             </a:r>
           </a:p>
           <a:p>
             <a:pPr lvl="1"/>
             <a:r>
-              <a:rPr lang="en-US"/>
+              <a:rPr lang="en-US" dirty="0"/>
               <a:t>Second level</a:t>
             </a:r>
           </a:p>
           <a:p>
             <a:pPr lvl="2"/>
             <a:r>
-              <a:rPr lang="en-US"/>
+              <a:rPr lang="en-US" dirty="0"/>
               <a:t>Third level</a:t>
             </a:r>
           </a:p>
           <a:p>
             <a:pPr lvl="3"/>
             <a:r>
-              <a:rPr lang="en-US"/>
+              <a:rPr lang="en-US" dirty="0"/>
               <a:t>Fourth level</a:t>
             </a:r>
           </a:p>
           <a:p>
             <a:pPr lvl="4"/>
             <a:r>
-              <a:rPr lang="en-US"/>
+              <a:rPr lang="en-US" dirty="0"/>
               <a:t>Fifth level</a:t>
             </a:r>
           </a:p>
@@ -589,11 +605,13 @@
           </a:bodyPr>
           <a:lstStyle>
             <a:lvl1pPr>
-              <a:defRPr sz="1200"/>
+              <a:defRPr sz="1200">
+                <a:latin typeface="Calibri"/>
+              </a:defRPr>
             </a:lvl1pPr>
           </a:lstStyle>
           <a:p>
-            <a:endParaRPr lang="en-US"/>
+            <a:endParaRPr lang="en-US" dirty="0"/>
           </a:p>
         </p:txBody>
       </p:sp>
@@ -632,16 +650,18 @@
           </a:bodyPr>
           <a:lstStyle>
             <a:lvl1pPr algn="r">
-              <a:defRPr sz="1200"/>
+              <a:defRPr sz="1200">
+                <a:latin typeface="Calibri"/>
+              </a:defRPr>
             </a:lvl1pPr>
           </a:lstStyle>
           <a:p>
             <a:fld id="{6B31ADDD-57C4-B84F-BC10-C03B067E1360}" type="slidenum">
-              <a:rPr lang="en-US"/>
+              <a:rPr lang="en-US" smtClean="0"/>
               <a:pPr/>
               <a:t>‹#›</a:t>
             </a:fld>
-            <a:endParaRPr lang="en-US"/>
+            <a:endParaRPr lang="en-US" dirty="0"/>
           </a:p>
         </p:txBody>
       </p:sp>
@@ -666,7 +686,7 @@
         <a:solidFill>
           <a:schemeClr val="tx1"/>
         </a:solidFill>
-        <a:latin typeface="Times" charset="0"/>
+        <a:latin typeface="Calibri"/>
         <a:ea typeface="+mn-ea"/>
         <a:cs typeface="+mn-cs"/>
       </a:defRPr>
@@ -682,8 +702,8 @@
         <a:solidFill>
           <a:schemeClr val="tx1"/>
         </a:solidFill>
-        <a:latin typeface="Times" charset="0"/>
-        <a:ea typeface="ＭＳ Ｐゴシック" charset="-128"/>
+        <a:latin typeface="Calibri"/>
+        <a:ea typeface="Calibri"/>
         <a:cs typeface="+mn-cs"/>
       </a:defRPr>
     </a:lvl2pPr>
@@ -698,8 +718,8 @@
         <a:solidFill>
           <a:schemeClr val="tx1"/>
         </a:solidFill>
-        <a:latin typeface="Times" charset="0"/>
-        <a:ea typeface="ＭＳ Ｐゴシック" charset="-128"/>
+        <a:latin typeface="Calibri"/>
+        <a:ea typeface="Calibri"/>
         <a:cs typeface="+mn-cs"/>
       </a:defRPr>
     </a:lvl3pPr>
@@ -714,8 +734,8 @@
         <a:solidFill>
           <a:schemeClr val="tx1"/>
         </a:solidFill>
-        <a:latin typeface="Times" charset="0"/>
-        <a:ea typeface="ＭＳ Ｐゴシック" charset="-128"/>
+        <a:latin typeface="Calibri"/>
+        <a:ea typeface="Calibri"/>
         <a:cs typeface="+mn-cs"/>
       </a:defRPr>
     </a:lvl4pPr>
@@ -730,8 +750,8 @@
         <a:solidFill>
           <a:schemeClr val="tx1"/>
         </a:solidFill>
-        <a:latin typeface="Times" charset="0"/>
-        <a:ea typeface="ＭＳ Ｐゴシック" charset="-128"/>
+        <a:latin typeface="Calibri"/>
+        <a:ea typeface="Calibri"/>
         <a:cs typeface="+mn-cs"/>
       </a:defRPr>
     </a:lvl5pPr>
@@ -3615,7 +3635,7 @@
           <a:p>
             <a:fld id="{DFA9ADAB-8CC6-D942-8BC6-81147D745CE5}" type="datetime1">
               <a:rPr lang="en-CA" smtClean="0"/>
-              <a:t>16-07-19</a:t>
+              <a:t>16-07-26</a:t>
             </a:fld>
             <a:endParaRPr lang="en-US"/>
           </a:p>
@@ -3793,7 +3813,7 @@
           <a:p>
             <a:fld id="{88A4D75B-3BD3-0341-9C7A-8253CF8A8762}" type="datetime1">
               <a:rPr lang="en-CA" smtClean="0"/>
-              <a:t>16-07-19</a:t>
+              <a:t>16-07-26</a:t>
             </a:fld>
             <a:endParaRPr lang="en-US"/>
           </a:p>
@@ -3981,7 +4001,7 @@
           <a:p>
             <a:fld id="{970EAFA9-DF02-754D-92F6-DD90137D2412}" type="datetime1">
               <a:rPr lang="en-CA" smtClean="0"/>
-              <a:t>16-07-19</a:t>
+              <a:t>16-07-26</a:t>
             </a:fld>
             <a:endParaRPr lang="en-US"/>
           </a:p>
@@ -4159,7 +4179,7 @@
           <a:p>
             <a:fld id="{2FC51022-7A81-D442-AE58-82A62A0590FF}" type="datetime1">
               <a:rPr lang="en-CA" smtClean="0"/>
-              <a:t>16-07-19</a:t>
+              <a:t>16-07-26</a:t>
             </a:fld>
             <a:endParaRPr lang="en-US"/>
           </a:p>
@@ -4359,7 +4379,7 @@
           <a:p>
             <a:fld id="{7CA1A87A-1F1C-8E4C-ADE7-67DB3200504C}" type="datetime1">
               <a:rPr lang="en-CA" smtClean="0"/>
-              <a:t>16-07-19</a:t>
+              <a:t>16-07-26</a:t>
             </a:fld>
             <a:endParaRPr lang="en-US"/>
           </a:p>
@@ -4655,7 +4675,7 @@
           <a:p>
             <a:fld id="{60C4FAD8-9DA9-E44C-8541-D2F4ED9A4950}" type="datetime1">
               <a:rPr lang="en-CA" smtClean="0"/>
-              <a:t>16-07-19</a:t>
+              <a:t>16-07-26</a:t>
             </a:fld>
             <a:endParaRPr lang="en-US"/>
           </a:p>
@@ -5090,7 +5110,7 @@
           <a:p>
             <a:fld id="{1B077D46-568A-0643-A344-42037456479A}" type="datetime1">
               <a:rPr lang="en-CA" smtClean="0"/>
-              <a:t>16-07-19</a:t>
+              <a:t>16-07-26</a:t>
             </a:fld>
             <a:endParaRPr lang="en-US"/>
           </a:p>
@@ -5216,7 +5236,7 @@
           <a:p>
             <a:fld id="{FC1AB61D-8AF5-4046-AAE2-AA5A4CCB66F9}" type="datetime1">
               <a:rPr lang="en-CA" smtClean="0"/>
-              <a:t>16-07-19</a:t>
+              <a:t>16-07-26</a:t>
             </a:fld>
             <a:endParaRPr lang="en-US"/>
           </a:p>
@@ -5319,7 +5339,7 @@
           <a:p>
             <a:fld id="{69AC00A6-68DF-4441-B71F-95C8F140F1B6}" type="datetime1">
               <a:rPr lang="en-CA" smtClean="0"/>
-              <a:t>16-07-19</a:t>
+              <a:t>16-07-26</a:t>
             </a:fld>
             <a:endParaRPr lang="en-US"/>
           </a:p>
@@ -5604,7 +5624,7 @@
           <a:p>
             <a:fld id="{35C016E9-0832-D744-948C-BBD5C7C199A0}" type="datetime1">
               <a:rPr lang="en-CA" smtClean="0"/>
-              <a:t>16-07-19</a:t>
+              <a:t>16-07-26</a:t>
             </a:fld>
             <a:endParaRPr lang="en-US"/>
           </a:p>
@@ -5865,7 +5885,7 @@
           <a:p>
             <a:fld id="{189A4066-4794-A541-9427-0634139FD47C}" type="datetime1">
               <a:rPr lang="en-CA" smtClean="0"/>
-              <a:t>16-07-19</a:t>
+              <a:t>16-07-26</a:t>
             </a:fld>
             <a:endParaRPr lang="en-US"/>
           </a:p>
@@ -6105,15 +6125,16 @@
           <a:lstStyle>
             <a:lvl1pPr>
               <a:defRPr sz="1400">
-                <a:latin typeface="Candara"/>
-                <a:cs typeface="Candara"/>
+                <a:latin typeface="Calibri"/>
+                <a:cs typeface="Calibri"/>
               </a:defRPr>
             </a:lvl1pPr>
           </a:lstStyle>
           <a:p>
             <a:fld id="{554B9F35-3B09-F849-85E4-9B3BDF95D01F}" type="datetime1">
               <a:rPr lang="en-CA" smtClean="0"/>
-              <a:t>16-07-19</a:t>
+              <a:pPr/>
+              <a:t>16-07-26</a:t>
             </a:fld>
             <a:endParaRPr lang="en-US" dirty="0"/>
           </a:p>
@@ -6154,11 +6175,13 @@
           </a:bodyPr>
           <a:lstStyle>
             <a:lvl1pPr algn="ctr">
-              <a:defRPr sz="1400"/>
+              <a:defRPr sz="1400">
+                <a:latin typeface="Calibri"/>
+              </a:defRPr>
             </a:lvl1pPr>
           </a:lstStyle>
           <a:p>
-            <a:endParaRPr lang="en-US"/>
+            <a:endParaRPr lang="en-US" dirty="0"/>
           </a:p>
         </p:txBody>
       </p:sp>
@@ -6198,8 +6221,8 @@
           <a:lstStyle>
             <a:lvl1pPr algn="r">
               <a:defRPr sz="1400">
-                <a:latin typeface="Candara"/>
-                <a:cs typeface="Candara"/>
+                <a:latin typeface="Calibri"/>
+                <a:cs typeface="Calibri"/>
               </a:defRPr>
             </a:lvl1pPr>
           </a:lstStyle>
@@ -6243,9 +6266,9 @@
           <a:solidFill>
             <a:schemeClr val="tx2"/>
           </a:solidFill>
-          <a:latin typeface="Candara"/>
+          <a:latin typeface="Calibri"/>
           <a:ea typeface="+mj-ea"/>
-          <a:cs typeface="Candara"/>
+          <a:cs typeface="Calibri"/>
         </a:defRPr>
       </a:lvl1pPr>
       <a:lvl2pPr algn="ctr" rtl="0" fontAlgn="base">
@@ -6374,9 +6397,9 @@
           <a:solidFill>
             <a:schemeClr val="tx1"/>
           </a:solidFill>
-          <a:latin typeface="Candara"/>
+          <a:latin typeface="Calibri"/>
           <a:ea typeface="+mn-ea"/>
-          <a:cs typeface="Candara"/>
+          <a:cs typeface="Calibri"/>
         </a:defRPr>
       </a:lvl1pPr>
       <a:lvl2pPr marL="742950" indent="-285750" algn="l" rtl="0" fontAlgn="base">
@@ -6391,9 +6414,9 @@
           <a:solidFill>
             <a:schemeClr val="tx1"/>
           </a:solidFill>
-          <a:latin typeface="Candara"/>
-          <a:ea typeface="ＭＳ Ｐゴシック" charset="-128"/>
-          <a:cs typeface="Candara"/>
+          <a:latin typeface="Calibri"/>
+          <a:ea typeface="Calibri"/>
+          <a:cs typeface="Calibri"/>
         </a:defRPr>
       </a:lvl2pPr>
       <a:lvl3pPr marL="1143000" indent="-228600" algn="l" rtl="0" fontAlgn="base">
@@ -6408,9 +6431,9 @@
           <a:solidFill>
             <a:schemeClr val="tx1"/>
           </a:solidFill>
-          <a:latin typeface="Candara"/>
-          <a:ea typeface="ＭＳ Ｐゴシック" charset="-128"/>
-          <a:cs typeface="Candara"/>
+          <a:latin typeface="Calibri"/>
+          <a:ea typeface="Calibri"/>
+          <a:cs typeface="Calibri"/>
         </a:defRPr>
       </a:lvl3pPr>
       <a:lvl4pPr marL="1600200" indent="-228600" algn="l" rtl="0" fontAlgn="base">
@@ -6425,9 +6448,9 @@
           <a:solidFill>
             <a:schemeClr val="tx1"/>
           </a:solidFill>
-          <a:latin typeface="Candara"/>
-          <a:ea typeface="ＭＳ Ｐゴシック" charset="-128"/>
-          <a:cs typeface="Candara"/>
+          <a:latin typeface="Calibri"/>
+          <a:ea typeface="Calibri"/>
+          <a:cs typeface="Calibri"/>
         </a:defRPr>
       </a:lvl4pPr>
       <a:lvl5pPr marL="2057400" indent="-228600" algn="l" rtl="0" fontAlgn="base">
@@ -6442,9 +6465,9 @@
           <a:solidFill>
             <a:schemeClr val="tx1"/>
           </a:solidFill>
-          <a:latin typeface="Candara"/>
-          <a:ea typeface="ＭＳ Ｐゴシック" charset="-128"/>
-          <a:cs typeface="Candara"/>
+          <a:latin typeface="Calibri"/>
+          <a:ea typeface="Calibri"/>
+          <a:cs typeface="Calibri"/>
         </a:defRPr>
       </a:lvl5pPr>
       <a:lvl6pPr marL="2514600" indent="-228600" algn="l" rtl="0" fontAlgn="base">
@@ -7065,10 +7088,10 @@
         </p:nvGrpSpPr>
         <p:grpSpPr bwMode="auto">
           <a:xfrm>
-            <a:off x="2438400" y="2667000"/>
-            <a:ext cx="3833813" cy="1257300"/>
+            <a:off x="2438400" y="2667002"/>
+            <a:ext cx="3767138" cy="1223963"/>
             <a:chOff x="2832" y="3216"/>
-            <a:chExt cx="2415" cy="792"/>
+            <a:chExt cx="2373" cy="771"/>
           </a:xfrm>
         </p:grpSpPr>
         <p:sp>
@@ -7082,7 +7105,7 @@
           <p:spPr bwMode="auto">
             <a:xfrm>
               <a:off x="2832" y="3216"/>
-              <a:ext cx="868" cy="312"/>
+              <a:ext cx="828" cy="291"/>
             </a:xfrm>
             <a:prstGeom prst="rect">
               <a:avLst/>
@@ -7108,7 +7131,9 @@
             <a:lstStyle/>
             <a:p>
               <a:r>
-                <a:rPr lang="en-US"/>
+                <a:rPr lang="en-US" dirty="0">
+                  <a:latin typeface="Calibri"/>
+                </a:rPr>
                 <a:t>a := d + e</a:t>
               </a:r>
             </a:p>
@@ -7125,7 +7150,7 @@
           <p:spPr bwMode="auto">
             <a:xfrm>
               <a:off x="4368" y="3216"/>
-              <a:ext cx="879" cy="312"/>
+              <a:ext cx="837" cy="291"/>
             </a:xfrm>
             <a:prstGeom prst="rect">
               <a:avLst/>
@@ -7151,7 +7176,9 @@
             <a:lstStyle/>
             <a:p>
               <a:r>
-                <a:rPr lang="en-US"/>
+                <a:rPr lang="en-US" dirty="0">
+                  <a:latin typeface="Calibri"/>
+                </a:rPr>
                 <a:t>b := d + e</a:t>
               </a:r>
             </a:p>
@@ -7168,7 +7195,7 @@
           <p:spPr bwMode="auto">
             <a:xfrm>
               <a:off x="3600" y="3696"/>
-              <a:ext cx="868" cy="312"/>
+              <a:ext cx="817" cy="291"/>
             </a:xfrm>
             <a:prstGeom prst="rect">
               <a:avLst/>
@@ -7194,7 +7221,9 @@
             <a:lstStyle/>
             <a:p>
               <a:r>
-                <a:rPr lang="en-US"/>
+                <a:rPr lang="en-US" dirty="0">
+                  <a:latin typeface="Calibri"/>
+                </a:rPr>
                 <a:t>c := d + e</a:t>
               </a:r>
             </a:p>
@@ -7212,8 +7241,8 @@
           </p:nvCxnSpPr>
           <p:spPr bwMode="auto">
             <a:xfrm>
-              <a:off x="3410" y="3540"/>
-              <a:ext cx="768" cy="144"/>
+              <a:off x="3246" y="3507"/>
+              <a:ext cx="763" cy="189"/>
             </a:xfrm>
             <a:prstGeom prst="straightConnector1">
               <a:avLst/>
@@ -7242,8 +7271,8 @@
           </p:nvCxnSpPr>
           <p:spPr bwMode="auto">
             <a:xfrm flipH="1">
-              <a:off x="4178" y="3540"/>
-              <a:ext cx="774" cy="144"/>
+              <a:off x="4009" y="3507"/>
+              <a:ext cx="778" cy="189"/>
             </a:xfrm>
             <a:prstGeom prst="straightConnector1">
               <a:avLst/>
@@ -7271,10 +7300,10 @@
         </p:nvGrpSpPr>
         <p:grpSpPr bwMode="auto">
           <a:xfrm>
-            <a:off x="2438400" y="4495800"/>
-            <a:ext cx="3765550" cy="1733550"/>
+            <a:off x="2438400" y="4495802"/>
+            <a:ext cx="3708400" cy="1700213"/>
             <a:chOff x="816" y="3924"/>
-            <a:chExt cx="2372" cy="1092"/>
+            <a:chExt cx="2336" cy="1071"/>
           </a:xfrm>
         </p:grpSpPr>
         <p:sp>
@@ -7288,7 +7317,7 @@
           <p:spPr bwMode="auto">
             <a:xfrm>
               <a:off x="816" y="3924"/>
-              <a:ext cx="836" cy="542"/>
+              <a:ext cx="800" cy="523"/>
             </a:xfrm>
             <a:prstGeom prst="rect">
               <a:avLst/>
@@ -7314,13 +7343,17 @@
             <a:lstStyle/>
             <a:p>
               <a:r>
-                <a:rPr lang="en-US"/>
+                <a:rPr lang="en-US" dirty="0">
+                  <a:latin typeface="Calibri"/>
+                </a:rPr>
                 <a:t>t := d + e</a:t>
               </a:r>
             </a:p>
             <a:p>
               <a:r>
-                <a:rPr lang="en-US"/>
+                <a:rPr lang="en-US" dirty="0">
+                  <a:latin typeface="Calibri"/>
+                </a:rPr>
                 <a:t>a := t</a:t>
               </a:r>
             </a:p>
@@ -7337,7 +7370,7 @@
           <p:spPr bwMode="auto">
             <a:xfrm>
               <a:off x="2352" y="3924"/>
-              <a:ext cx="836" cy="542"/>
+              <a:ext cx="800" cy="523"/>
             </a:xfrm>
             <a:prstGeom prst="rect">
               <a:avLst/>
@@ -7363,13 +7396,17 @@
             <a:lstStyle/>
             <a:p>
               <a:r>
-                <a:rPr lang="en-US"/>
+                <a:rPr lang="en-US" dirty="0">
+                  <a:latin typeface="Calibri"/>
+                </a:rPr>
                 <a:t>t := d + e</a:t>
               </a:r>
             </a:p>
             <a:p>
               <a:r>
-                <a:rPr lang="en-US"/>
+                <a:rPr lang="en-US" dirty="0">
+                  <a:latin typeface="Calibri"/>
+                </a:rPr>
                 <a:t>b := t</a:t>
               </a:r>
             </a:p>
@@ -7386,7 +7423,7 @@
           <p:spPr bwMode="auto">
             <a:xfrm>
               <a:off x="1728" y="4704"/>
-              <a:ext cx="536" cy="312"/>
+              <a:ext cx="499" cy="291"/>
             </a:xfrm>
             <a:prstGeom prst="rect">
               <a:avLst/>
@@ -7412,7 +7449,9 @@
             <a:lstStyle/>
             <a:p>
               <a:r>
-                <a:rPr lang="en-US"/>
+                <a:rPr lang="en-US" dirty="0">
+                  <a:latin typeface="Calibri"/>
+                </a:rPr>
                 <a:t>c := t</a:t>
               </a:r>
             </a:p>
@@ -7430,8 +7469,8 @@
           </p:nvCxnSpPr>
           <p:spPr bwMode="auto">
             <a:xfrm>
-              <a:off x="1378" y="4478"/>
-              <a:ext cx="714" cy="214"/>
+              <a:off x="1216" y="4447"/>
+              <a:ext cx="762" cy="257"/>
             </a:xfrm>
             <a:prstGeom prst="straightConnector1">
               <a:avLst/>
@@ -7460,8 +7499,8 @@
           </p:nvCxnSpPr>
           <p:spPr bwMode="auto">
             <a:xfrm flipH="1">
-              <a:off x="2092" y="4478"/>
-              <a:ext cx="822" cy="214"/>
+              <a:off x="1978" y="4447"/>
+              <a:ext cx="774" cy="257"/>
             </a:xfrm>
             <a:prstGeom prst="straightConnector1">
               <a:avLst/>
@@ -7880,7 +7919,7 @@
           <a:p>
             <a:pPr marL="609600" indent="-609600"/>
             <a:r>
-              <a:rPr lang="en-US"/>
+              <a:rPr lang="en-US" dirty="0"/>
               <a:t>Renaming temporary variables</a:t>
             </a:r>
           </a:p>
@@ -7890,8 +7929,24 @@
               <a:buNone/>
             </a:pPr>
             <a:r>
-              <a:rPr lang="en-US" sz="2800"/>
-              <a:t>t1 := b+c  can be changed to t2 := b+c </a:t>
+              <a:rPr lang="en-US" sz="2800" dirty="0"/>
+              <a:t>t1 := </a:t>
+            </a:r>
+            <a:r>
+              <a:rPr lang="en-US" sz="2800" dirty="0" err="1"/>
+              <a:t>b+c</a:t>
+            </a:r>
+            <a:r>
+              <a:rPr lang="en-US" sz="2800" dirty="0"/>
+              <a:t>  can be changed to t2 := </a:t>
+            </a:r>
+            <a:r>
+              <a:rPr lang="en-US" sz="2800" dirty="0" err="1"/>
+              <a:t>b+c</a:t>
+            </a:r>
+            <a:r>
+              <a:rPr lang="en-US" sz="2800" dirty="0"/>
+              <a:t> </a:t>
             </a:r>
           </a:p>
           <a:p>
@@ -7900,14 +7955,14 @@
               <a:buNone/>
             </a:pPr>
             <a:r>
-              <a:rPr lang="en-US" sz="2800"/>
+              <a:rPr lang="en-US" sz="2800" dirty="0"/>
               <a:t>replace all instances of t1 with t2</a:t>
             </a:r>
           </a:p>
           <a:p>
             <a:pPr marL="609600" indent="-609600"/>
             <a:r>
-              <a:rPr lang="en-US"/>
+              <a:rPr lang="en-US" dirty="0"/>
               <a:t>Interchange of statements</a:t>
             </a:r>
           </a:p>
@@ -7917,9 +7972,22 @@
               <a:buNone/>
             </a:pPr>
             <a:r>
-              <a:rPr lang="en-US" sz="2800"/>
-              <a:t>t1 := b+c                                      t2 := x+y</a:t>
-            </a:r>
+              <a:rPr lang="en-US" sz="2800" dirty="0"/>
+              <a:t>t1 := </a:t>
+            </a:r>
+            <a:r>
+              <a:rPr lang="en-US" sz="2800" dirty="0" err="1"/>
+              <a:t>b+c</a:t>
+            </a:r>
+            <a:r>
+              <a:rPr lang="en-US" sz="2800" dirty="0"/>
+              <a:t>                                      t2 := </a:t>
+            </a:r>
+            <a:r>
+              <a:rPr lang="en-US" sz="2800" dirty="0" err="1"/>
+              <a:t>x+y</a:t>
+            </a:r>
+            <a:endParaRPr lang="en-US" sz="2800" dirty="0"/>
           </a:p>
           <a:p>
             <a:pPr marL="1371600" lvl="2" indent="-457200">
@@ -7927,8 +7995,35 @@
               <a:buNone/>
             </a:pPr>
             <a:r>
-              <a:rPr lang="en-US" sz="2800"/>
-              <a:t>t2 := x+y    can be converted to  t1 := b+c</a:t>
+              <a:rPr lang="en-US" sz="2800" dirty="0"/>
+              <a:t>t2 := </a:t>
+            </a:r>
+            <a:r>
+              <a:rPr lang="en-US" sz="2800" dirty="0" err="1"/>
+              <a:t>x+y</a:t>
+            </a:r>
+            <a:r>
+              <a:rPr lang="en-US" sz="2800" dirty="0"/>
+              <a:t>    can be converted to  t1 := </a:t>
+            </a:r>
+            <a:r>
+              <a:rPr lang="en-US" sz="2800" dirty="0" err="1"/>
+              <a:t>b+</a:t>
+            </a:r>
+            <a:r>
+              <a:rPr lang="en-US" sz="2800" dirty="0" err="1" smtClean="0"/>
+              <a:t>c</a:t>
+            </a:r>
+            <a:endParaRPr lang="en-US" sz="2800" dirty="0"/>
+          </a:p>
+          <a:p>
+            <a:pPr marL="971550" lvl="1" indent="-457200">
+              <a:buFontTx/>
+              <a:buNone/>
+            </a:pPr>
+            <a:r>
+              <a:rPr lang="en-US" sz="3200" dirty="0" smtClean="0"/>
+              <a:t>(Can be combined with branch delay slots or load delay slots)</a:t>
             </a:r>
           </a:p>
         </p:txBody>
@@ -8844,7 +8939,7 @@
         <p:spPr bwMode="auto">
           <a:xfrm>
             <a:off x="1219200" y="1752600"/>
-            <a:ext cx="2255838" cy="831850"/>
+            <a:ext cx="2149597" cy="830997"/>
           </a:xfrm>
           <a:prstGeom prst="rect">
             <a:avLst/>
@@ -8872,16 +8967,22 @@
           <a:lstStyle/>
           <a:p>
             <a:r>
-              <a:rPr lang="en-US"/>
+              <a:rPr lang="en-US" dirty="0">
+                <a:latin typeface="Calibri"/>
+              </a:rPr>
               <a:t>1: i1 := 1  j1 := 1</a:t>
             </a:r>
           </a:p>
           <a:p>
             <a:r>
-              <a:rPr lang="en-US"/>
+              <a:rPr lang="en-US" dirty="0">
+                <a:latin typeface="Calibri"/>
+              </a:rPr>
               <a:t>    k1 := 0</a:t>
             </a:r>
-            <a:endParaRPr lang="en-US" sz="2800"/>
+            <a:endParaRPr lang="en-US" sz="2800" dirty="0">
+              <a:latin typeface="Calibri"/>
+            </a:endParaRPr>
           </a:p>
         </p:txBody>
       </p:sp>
@@ -8924,11 +9025,14 @@
           <a:lstStyle/>
           <a:p>
             <a:r>
-              <a:rPr lang="en-US"/>
+              <a:rPr lang="en-US" dirty="0">
+                <a:latin typeface="Calibri"/>
+              </a:rPr>
               <a:t>2: j2 := </a:t>
             </a:r>
             <a:r>
-              <a:rPr lang="en-US">
+              <a:rPr lang="en-US" dirty="0">
+                <a:latin typeface="Calibri"/>
                 <a:sym typeface="Symbol" charset="2"/>
               </a:rPr>
               <a:t>(j4, j1)</a:t>
@@ -8936,17 +9040,21 @@
           </a:p>
           <a:p>
             <a:r>
-              <a:rPr lang="en-US">
+              <a:rPr lang="en-US" dirty="0">
+                <a:latin typeface="Calibri"/>
                 <a:sym typeface="Symbol" charset="2"/>
               </a:rPr>
               <a:t>    </a:t>
             </a:r>
             <a:r>
-              <a:rPr lang="en-US"/>
+              <a:rPr lang="en-US" dirty="0">
+                <a:latin typeface="Calibri"/>
+              </a:rPr>
               <a:t>k2 := </a:t>
             </a:r>
             <a:r>
-              <a:rPr lang="en-US">
+              <a:rPr lang="en-US" dirty="0">
+                <a:latin typeface="Calibri"/>
                 <a:sym typeface="Symbol" charset="2"/>
               </a:rPr>
               <a:t>(k4, k1)</a:t>
@@ -8954,13 +9062,16 @@
           </a:p>
           <a:p>
             <a:r>
-              <a:rPr lang="en-US">
+              <a:rPr lang="en-US" dirty="0">
+                <a:latin typeface="Calibri"/>
                 <a:sym typeface="Symbol" charset="2"/>
               </a:rPr>
               <a:t>   </a:t>
             </a:r>
             <a:r>
-              <a:rPr lang="en-US"/>
+              <a:rPr lang="en-US" dirty="0">
+                <a:latin typeface="Calibri"/>
+              </a:rPr>
               <a:t> if k2 &lt; 100</a:t>
             </a:r>
           </a:p>
@@ -9005,10 +9116,14 @@
           <a:lstStyle/>
           <a:p>
             <a:r>
-              <a:rPr lang="en-US"/>
+              <a:rPr lang="en-US" dirty="0">
+                <a:latin typeface="Calibri"/>
+              </a:rPr>
               <a:t>3: if j2 &lt; 20</a:t>
             </a:r>
-            <a:endParaRPr lang="en-US" sz="2800"/>
+            <a:endParaRPr lang="en-US" sz="2800" dirty="0">
+              <a:latin typeface="Calibri"/>
+            </a:endParaRPr>
           </a:p>
         </p:txBody>
       </p:sp>
@@ -9024,8 +9139,8 @@
         </p:nvCxnSpPr>
         <p:spPr bwMode="auto">
           <a:xfrm>
-            <a:off x="3475038" y="2168525"/>
-            <a:ext cx="1096962" cy="106363"/>
+            <a:off x="3368797" y="2168099"/>
+            <a:ext cx="1203203" cy="106789"/>
           </a:xfrm>
           <a:prstGeom prst="straightConnector1">
             <a:avLst/>
@@ -9111,7 +9226,9 @@
           <a:lstStyle/>
           <a:p>
             <a:r>
-              <a:rPr lang="en-US"/>
+              <a:rPr lang="en-US" dirty="0">
+                <a:latin typeface="Calibri"/>
+              </a:rPr>
               <a:t>4: return j2</a:t>
             </a:r>
           </a:p>
@@ -9156,13 +9273,17 @@
           <a:lstStyle/>
           <a:p>
             <a:r>
-              <a:rPr lang="en-US"/>
+              <a:rPr lang="en-US" dirty="0">
+                <a:latin typeface="Calibri"/>
+              </a:rPr>
               <a:t>5: j3 := i1</a:t>
             </a:r>
           </a:p>
           <a:p>
             <a:r>
-              <a:rPr lang="en-US"/>
+              <a:rPr lang="en-US" dirty="0">
+                <a:latin typeface="Calibri"/>
+              </a:rPr>
               <a:t>    k3 := k2+1</a:t>
             </a:r>
           </a:p>
@@ -9207,20 +9328,28 @@
           <a:lstStyle/>
           <a:p>
             <a:r>
-              <a:rPr lang="en-US" dirty="0"/>
+              <a:rPr lang="en-US" dirty="0">
+                <a:latin typeface="Calibri"/>
+              </a:rPr>
               <a:t>6: j5 := k2</a:t>
             </a:r>
           </a:p>
           <a:p>
             <a:r>
-              <a:rPr lang="en-US" dirty="0"/>
+              <a:rPr lang="en-US" dirty="0">
+                <a:latin typeface="Calibri"/>
+              </a:rPr>
               <a:t>    k5 := k2</a:t>
             </a:r>
             <a:r>
-              <a:rPr lang="en-US" dirty="0" smtClean="0"/>
+              <a:rPr lang="en-US" dirty="0" smtClean="0">
+                <a:latin typeface="Calibri"/>
+              </a:rPr>
               <a:t>+1</a:t>
             </a:r>
-            <a:endParaRPr lang="en-US" sz="2800" dirty="0"/>
+            <a:endParaRPr lang="en-US" sz="2800" dirty="0">
+              <a:latin typeface="Calibri"/>
+            </a:endParaRPr>
           </a:p>
         </p:txBody>
       </p:sp>
@@ -9263,11 +9392,14 @@
           <a:lstStyle/>
           <a:p>
             <a:r>
-              <a:rPr lang="en-US"/>
+              <a:rPr lang="en-US" dirty="0">
+                <a:latin typeface="Calibri"/>
+              </a:rPr>
               <a:t>7: j4 := </a:t>
             </a:r>
             <a:r>
-              <a:rPr lang="en-US">
+              <a:rPr lang="en-US" dirty="0">
+                <a:latin typeface="Calibri"/>
                 <a:sym typeface="Symbol" charset="2"/>
               </a:rPr>
               <a:t>(j3, j5)</a:t>
@@ -9275,15 +9407,20 @@
           </a:p>
           <a:p>
             <a:r>
-              <a:rPr lang="en-US" sz="2800"/>
+              <a:rPr lang="en-US" sz="2800" dirty="0">
+                <a:latin typeface="Calibri"/>
+              </a:rPr>
               <a:t>   </a:t>
             </a:r>
             <a:r>
-              <a:rPr lang="en-US"/>
+              <a:rPr lang="en-US" dirty="0">
+                <a:latin typeface="Calibri"/>
+              </a:rPr>
               <a:t>k4 := </a:t>
             </a:r>
             <a:r>
-              <a:rPr lang="en-US">
+              <a:rPr lang="en-US" dirty="0">
+                <a:latin typeface="Calibri"/>
                 <a:sym typeface="Symbol" charset="2"/>
               </a:rPr>
               <a:t>(k3,k5)</a:t>
@@ -10088,7 +10225,7 @@
         <p:spPr bwMode="auto">
           <a:xfrm>
             <a:off x="1219200" y="1752600"/>
-            <a:ext cx="2255838" cy="831850"/>
+            <a:ext cx="2149597" cy="830997"/>
           </a:xfrm>
           <a:prstGeom prst="rect">
             <a:avLst/>
@@ -10116,16 +10253,22 @@
           <a:lstStyle/>
           <a:p>
             <a:r>
-              <a:rPr lang="en-US"/>
+              <a:rPr lang="en-US" dirty="0">
+                <a:latin typeface="Calibri"/>
+              </a:rPr>
               <a:t>1: i1 := 1  j1 := 1</a:t>
             </a:r>
           </a:p>
           <a:p>
             <a:r>
-              <a:rPr lang="en-US"/>
+              <a:rPr lang="en-US" dirty="0">
+                <a:latin typeface="Calibri"/>
+              </a:rPr>
               <a:t>    k1 := 0</a:t>
             </a:r>
-            <a:endParaRPr lang="en-US" sz="2800"/>
+            <a:endParaRPr lang="en-US" sz="2800" dirty="0">
+              <a:latin typeface="Calibri"/>
+            </a:endParaRPr>
           </a:p>
         </p:txBody>
       </p:sp>
@@ -10168,11 +10311,14 @@
           <a:lstStyle/>
           <a:p>
             <a:r>
-              <a:rPr lang="en-US"/>
+              <a:rPr lang="en-US" dirty="0">
+                <a:latin typeface="Calibri"/>
+              </a:rPr>
               <a:t>2: j2 := </a:t>
             </a:r>
             <a:r>
-              <a:rPr lang="en-US">
+              <a:rPr lang="en-US" dirty="0">
+                <a:latin typeface="Calibri"/>
                 <a:sym typeface="Symbol" charset="2"/>
               </a:rPr>
               <a:t>(j4, 1)</a:t>
@@ -10180,17 +10326,21 @@
           </a:p>
           <a:p>
             <a:r>
-              <a:rPr lang="en-US">
+              <a:rPr lang="en-US" dirty="0">
+                <a:latin typeface="Calibri"/>
                 <a:sym typeface="Symbol" charset="2"/>
               </a:rPr>
               <a:t>    </a:t>
             </a:r>
             <a:r>
-              <a:rPr lang="en-US"/>
+              <a:rPr lang="en-US" dirty="0">
+                <a:latin typeface="Calibri"/>
+              </a:rPr>
               <a:t>k2 := </a:t>
             </a:r>
             <a:r>
-              <a:rPr lang="en-US">
+              <a:rPr lang="en-US" dirty="0">
+                <a:latin typeface="Calibri"/>
                 <a:sym typeface="Symbol" charset="2"/>
               </a:rPr>
               <a:t>(k4, 0)</a:t>
@@ -10198,13 +10348,16 @@
           </a:p>
           <a:p>
             <a:r>
-              <a:rPr lang="en-US">
+              <a:rPr lang="en-US" dirty="0">
+                <a:latin typeface="Calibri"/>
                 <a:sym typeface="Symbol" charset="2"/>
               </a:rPr>
               <a:t>   </a:t>
             </a:r>
             <a:r>
-              <a:rPr lang="en-US"/>
+              <a:rPr lang="en-US" dirty="0">
+                <a:latin typeface="Calibri"/>
+              </a:rPr>
               <a:t> if k2 &lt; 100</a:t>
             </a:r>
           </a:p>
@@ -10249,10 +10402,14 @@
           <a:lstStyle/>
           <a:p>
             <a:r>
-              <a:rPr lang="en-US"/>
+              <a:rPr lang="en-US" dirty="0">
+                <a:latin typeface="Calibri"/>
+              </a:rPr>
               <a:t>3: if j2 &lt; 20</a:t>
             </a:r>
-            <a:endParaRPr lang="en-US" sz="2800"/>
+            <a:endParaRPr lang="en-US" sz="2800" dirty="0">
+              <a:latin typeface="Calibri"/>
+            </a:endParaRPr>
           </a:p>
         </p:txBody>
       </p:sp>
@@ -10268,8 +10425,8 @@
         </p:nvCxnSpPr>
         <p:spPr bwMode="auto">
           <a:xfrm>
-            <a:off x="3475038" y="2168525"/>
-            <a:ext cx="1096962" cy="106363"/>
+            <a:off x="3368797" y="2168099"/>
+            <a:ext cx="1203203" cy="106789"/>
           </a:xfrm>
           <a:prstGeom prst="straightConnector1">
             <a:avLst/>
@@ -10355,7 +10512,9 @@
           <a:lstStyle/>
           <a:p>
             <a:r>
-              <a:rPr lang="en-US"/>
+              <a:rPr lang="en-US" dirty="0">
+                <a:latin typeface="Calibri"/>
+              </a:rPr>
               <a:t>4: return j2</a:t>
             </a:r>
           </a:p>
@@ -10400,13 +10559,17 @@
           <a:lstStyle/>
           <a:p>
             <a:r>
-              <a:rPr lang="en-US"/>
+              <a:rPr lang="en-US" dirty="0">
+                <a:latin typeface="Calibri"/>
+              </a:rPr>
               <a:t>5: j3 := 1</a:t>
             </a:r>
           </a:p>
           <a:p>
             <a:r>
-              <a:rPr lang="en-US"/>
+              <a:rPr lang="en-US" dirty="0">
+                <a:latin typeface="Calibri"/>
+              </a:rPr>
               <a:t>    k3 := k2+1</a:t>
             </a:r>
           </a:p>
@@ -10451,20 +10614,28 @@
           <a:lstStyle/>
           <a:p>
             <a:r>
-              <a:rPr lang="en-US" dirty="0"/>
+              <a:rPr lang="en-US" dirty="0">
+                <a:latin typeface="Calibri"/>
+              </a:rPr>
               <a:t>6: j5 := k2</a:t>
             </a:r>
           </a:p>
           <a:p>
             <a:r>
-              <a:rPr lang="en-US" dirty="0"/>
+              <a:rPr lang="en-US" dirty="0">
+                <a:latin typeface="Calibri"/>
+              </a:rPr>
               <a:t>    k5 := k2</a:t>
             </a:r>
             <a:r>
-              <a:rPr lang="en-US" dirty="0" smtClean="0"/>
+              <a:rPr lang="en-US" dirty="0" smtClean="0">
+                <a:latin typeface="Calibri"/>
+              </a:rPr>
               <a:t>+1</a:t>
             </a:r>
-            <a:endParaRPr lang="en-US" sz="2800" dirty="0"/>
+            <a:endParaRPr lang="en-US" sz="2800" dirty="0">
+              <a:latin typeface="Calibri"/>
+            </a:endParaRPr>
           </a:p>
         </p:txBody>
       </p:sp>
@@ -10507,11 +10678,14 @@
           <a:lstStyle/>
           <a:p>
             <a:r>
-              <a:rPr lang="en-US"/>
+              <a:rPr lang="en-US" dirty="0">
+                <a:latin typeface="Calibri"/>
+              </a:rPr>
               <a:t>7: j4 := </a:t>
             </a:r>
             <a:r>
-              <a:rPr lang="en-US">
+              <a:rPr lang="en-US" dirty="0">
+                <a:latin typeface="Calibri"/>
                 <a:sym typeface="Symbol" charset="2"/>
               </a:rPr>
               <a:t>(j3, k2)</a:t>
@@ -10519,15 +10693,20 @@
           </a:p>
           <a:p>
             <a:r>
-              <a:rPr lang="en-US" sz="2800"/>
+              <a:rPr lang="en-US" sz="2800" dirty="0">
+                <a:latin typeface="Calibri"/>
+              </a:rPr>
               <a:t>   </a:t>
             </a:r>
             <a:r>
-              <a:rPr lang="en-US"/>
+              <a:rPr lang="en-US" dirty="0">
+                <a:latin typeface="Calibri"/>
+              </a:rPr>
               <a:t>k4 := </a:t>
             </a:r>
             <a:r>
-              <a:rPr lang="en-US">
+              <a:rPr lang="en-US" dirty="0">
+                <a:latin typeface="Calibri"/>
                 <a:sym typeface="Symbol" charset="2"/>
               </a:rPr>
               <a:t>(k3,k5)</a:t>
@@ -10808,7 +10987,7 @@
         <p:spPr bwMode="auto">
           <a:xfrm>
             <a:off x="1219200" y="1752600"/>
-            <a:ext cx="2255838" cy="831850"/>
+            <a:ext cx="2149597" cy="830997"/>
           </a:xfrm>
           <a:prstGeom prst="rect">
             <a:avLst/>
@@ -10836,16 +11015,22 @@
           <a:lstStyle/>
           <a:p>
             <a:r>
-              <a:rPr lang="en-US"/>
+              <a:rPr lang="en-US" dirty="0">
+                <a:latin typeface="Calibri"/>
+              </a:rPr>
               <a:t>1: i1 := 1  j1 := 1</a:t>
             </a:r>
           </a:p>
           <a:p>
             <a:r>
-              <a:rPr lang="en-US"/>
+              <a:rPr lang="en-US" dirty="0">
+                <a:latin typeface="Calibri"/>
+              </a:rPr>
               <a:t>    k1 := 0</a:t>
             </a:r>
-            <a:endParaRPr lang="en-US" sz="2800"/>
+            <a:endParaRPr lang="en-US" sz="2800" dirty="0">
+              <a:latin typeface="Calibri"/>
+            </a:endParaRPr>
           </a:p>
         </p:txBody>
       </p:sp>
@@ -10888,11 +11073,14 @@
           <a:lstStyle/>
           <a:p>
             <a:r>
-              <a:rPr lang="en-US"/>
+              <a:rPr lang="en-US" dirty="0">
+                <a:latin typeface="Calibri"/>
+              </a:rPr>
               <a:t>2: j2 := </a:t>
             </a:r>
             <a:r>
-              <a:rPr lang="en-US">
+              <a:rPr lang="en-US" dirty="0">
+                <a:latin typeface="Calibri"/>
                 <a:sym typeface="Symbol" charset="2"/>
               </a:rPr>
               <a:t>(j4, 1)</a:t>
@@ -10900,17 +11088,21 @@
           </a:p>
           <a:p>
             <a:r>
-              <a:rPr lang="en-US">
+              <a:rPr lang="en-US" dirty="0">
+                <a:latin typeface="Calibri"/>
                 <a:sym typeface="Symbol" charset="2"/>
               </a:rPr>
               <a:t>    </a:t>
             </a:r>
             <a:r>
-              <a:rPr lang="en-US"/>
+              <a:rPr lang="en-US" dirty="0">
+                <a:latin typeface="Calibri"/>
+              </a:rPr>
               <a:t>k2 := </a:t>
             </a:r>
             <a:r>
-              <a:rPr lang="en-US">
+              <a:rPr lang="en-US" dirty="0">
+                <a:latin typeface="Calibri"/>
                 <a:sym typeface="Symbol" charset="2"/>
               </a:rPr>
               <a:t>(k4, 0)</a:t>
@@ -10918,13 +11110,16 @@
           </a:p>
           <a:p>
             <a:r>
-              <a:rPr lang="en-US">
+              <a:rPr lang="en-US" dirty="0">
+                <a:latin typeface="Calibri"/>
                 <a:sym typeface="Symbol" charset="2"/>
               </a:rPr>
               <a:t>   </a:t>
             </a:r>
             <a:r>
-              <a:rPr lang="en-US"/>
+              <a:rPr lang="en-US" dirty="0">
+                <a:latin typeface="Calibri"/>
+              </a:rPr>
               <a:t> if k2 &lt; 100</a:t>
             </a:r>
           </a:p>
@@ -10969,10 +11164,14 @@
           <a:lstStyle/>
           <a:p>
             <a:r>
-              <a:rPr lang="en-US"/>
+              <a:rPr lang="en-US" dirty="0">
+                <a:latin typeface="Calibri"/>
+              </a:rPr>
               <a:t>3: if j2 &lt; 20</a:t>
             </a:r>
-            <a:endParaRPr lang="en-US" sz="2800"/>
+            <a:endParaRPr lang="en-US" sz="2800" dirty="0">
+              <a:latin typeface="Calibri"/>
+            </a:endParaRPr>
           </a:p>
         </p:txBody>
       </p:sp>
@@ -10988,8 +11187,8 @@
         </p:nvCxnSpPr>
         <p:spPr bwMode="auto">
           <a:xfrm>
-            <a:off x="3475038" y="2168525"/>
-            <a:ext cx="1096962" cy="106363"/>
+            <a:off x="3368797" y="2168099"/>
+            <a:ext cx="1203203" cy="106789"/>
           </a:xfrm>
           <a:prstGeom prst="straightConnector1">
             <a:avLst/>
@@ -11075,7 +11274,9 @@
           <a:lstStyle/>
           <a:p>
             <a:r>
-              <a:rPr lang="en-US"/>
+              <a:rPr lang="en-US" dirty="0">
+                <a:latin typeface="Calibri"/>
+              </a:rPr>
               <a:t>4: return j2</a:t>
             </a:r>
           </a:p>
@@ -11120,13 +11321,17 @@
           <a:lstStyle/>
           <a:p>
             <a:r>
-              <a:rPr lang="en-US"/>
+              <a:rPr lang="en-US" dirty="0">
+                <a:latin typeface="Calibri"/>
+              </a:rPr>
               <a:t>5: j3 := 1</a:t>
             </a:r>
           </a:p>
           <a:p>
             <a:r>
-              <a:rPr lang="en-US"/>
+              <a:rPr lang="en-US" dirty="0">
+                <a:latin typeface="Calibri"/>
+              </a:rPr>
               <a:t>    k3 := k2+1</a:t>
             </a:r>
           </a:p>
@@ -11171,24 +11376,34 @@
           <a:lstStyle/>
           <a:p>
             <a:r>
-              <a:rPr lang="en-US" dirty="0"/>
+              <a:rPr lang="en-US" dirty="0">
+                <a:latin typeface="Calibri"/>
+              </a:rPr>
               <a:t>6</a:t>
             </a:r>
             <a:r>
-              <a:rPr lang="en-US" dirty="0" smtClean="0"/>
+              <a:rPr lang="en-US" dirty="0" smtClean="0">
+                <a:latin typeface="Calibri"/>
+              </a:rPr>
               <a:t>:</a:t>
             </a:r>
           </a:p>
           <a:p>
             <a:r>
-              <a:rPr lang="en-US" dirty="0"/>
+              <a:rPr lang="en-US" dirty="0">
+                <a:latin typeface="Calibri"/>
+              </a:rPr>
               <a:t>    k5 := k2</a:t>
             </a:r>
             <a:r>
-              <a:rPr lang="en-US" dirty="0" smtClean="0"/>
+              <a:rPr lang="en-US" dirty="0" smtClean="0">
+                <a:latin typeface="Calibri"/>
+              </a:rPr>
               <a:t>+1</a:t>
             </a:r>
-            <a:endParaRPr lang="en-US" sz="2800" dirty="0"/>
+            <a:endParaRPr lang="en-US" sz="2800" dirty="0">
+              <a:latin typeface="Calibri"/>
+            </a:endParaRPr>
           </a:p>
         </p:txBody>
       </p:sp>
@@ -11231,11 +11446,14 @@
           <a:lstStyle/>
           <a:p>
             <a:r>
-              <a:rPr lang="en-US"/>
+              <a:rPr lang="en-US" dirty="0">
+                <a:latin typeface="Calibri"/>
+              </a:rPr>
               <a:t>7: j4 := </a:t>
             </a:r>
             <a:r>
-              <a:rPr lang="en-US">
+              <a:rPr lang="en-US" dirty="0">
+                <a:latin typeface="Calibri"/>
                 <a:sym typeface="Symbol" charset="2"/>
               </a:rPr>
               <a:t>(j3, k2)</a:t>
@@ -11243,15 +11461,20 @@
           </a:p>
           <a:p>
             <a:r>
-              <a:rPr lang="en-US" sz="2800"/>
+              <a:rPr lang="en-US" sz="2800" dirty="0">
+                <a:latin typeface="Calibri"/>
+              </a:rPr>
               <a:t>   </a:t>
             </a:r>
             <a:r>
-              <a:rPr lang="en-US"/>
+              <a:rPr lang="en-US" dirty="0">
+                <a:latin typeface="Calibri"/>
+              </a:rPr>
               <a:t>k4 := </a:t>
             </a:r>
             <a:r>
-              <a:rPr lang="en-US">
+              <a:rPr lang="en-US" dirty="0">
+                <a:latin typeface="Calibri"/>
                 <a:sym typeface="Symbol" charset="2"/>
               </a:rPr>
               <a:t>(k3,k5)</a:t>
@@ -11532,7 +11755,7 @@
         <p:spPr bwMode="auto">
           <a:xfrm>
             <a:off x="1219200" y="1752600"/>
-            <a:ext cx="2255838" cy="831850"/>
+            <a:ext cx="2149597" cy="830997"/>
           </a:xfrm>
           <a:prstGeom prst="rect">
             <a:avLst/>
@@ -11560,16 +11783,22 @@
           <a:lstStyle/>
           <a:p>
             <a:r>
-              <a:rPr lang="en-US"/>
+              <a:rPr lang="en-US" dirty="0">
+                <a:latin typeface="Calibri"/>
+              </a:rPr>
               <a:t>1: i1 := 1  j1 := 1</a:t>
             </a:r>
           </a:p>
           <a:p>
             <a:r>
-              <a:rPr lang="en-US"/>
+              <a:rPr lang="en-US" dirty="0">
+                <a:latin typeface="Calibri"/>
+              </a:rPr>
               <a:t>    k1 := 0</a:t>
             </a:r>
-            <a:endParaRPr lang="en-US" sz="2800"/>
+            <a:endParaRPr lang="en-US" sz="2800" dirty="0">
+              <a:latin typeface="Calibri"/>
+            </a:endParaRPr>
           </a:p>
         </p:txBody>
       </p:sp>
@@ -11612,11 +11841,14 @@
           <a:lstStyle/>
           <a:p>
             <a:r>
-              <a:rPr lang="en-US"/>
+              <a:rPr lang="en-US" dirty="0">
+                <a:latin typeface="Calibri"/>
+              </a:rPr>
               <a:t>2: j2 := </a:t>
             </a:r>
             <a:r>
-              <a:rPr lang="en-US">
+              <a:rPr lang="en-US" dirty="0">
+                <a:latin typeface="Calibri"/>
                 <a:sym typeface="Symbol" charset="2"/>
               </a:rPr>
               <a:t>(j4, 1)</a:t>
@@ -11624,17 +11856,21 @@
           </a:p>
           <a:p>
             <a:r>
-              <a:rPr lang="en-US">
+              <a:rPr lang="en-US" dirty="0">
+                <a:latin typeface="Calibri"/>
                 <a:sym typeface="Symbol" charset="2"/>
               </a:rPr>
               <a:t>    </a:t>
             </a:r>
             <a:r>
-              <a:rPr lang="en-US"/>
+              <a:rPr lang="en-US" dirty="0">
+                <a:latin typeface="Calibri"/>
+              </a:rPr>
               <a:t>k2 := </a:t>
             </a:r>
             <a:r>
-              <a:rPr lang="en-US">
+              <a:rPr lang="en-US" dirty="0">
+                <a:latin typeface="Calibri"/>
                 <a:sym typeface="Symbol" charset="2"/>
               </a:rPr>
               <a:t>(k4, 0)</a:t>
@@ -11642,13 +11878,16 @@
           </a:p>
           <a:p>
             <a:r>
-              <a:rPr lang="en-US">
+              <a:rPr lang="en-US" dirty="0">
+                <a:latin typeface="Calibri"/>
                 <a:sym typeface="Symbol" charset="2"/>
               </a:rPr>
               <a:t>   </a:t>
             </a:r>
             <a:r>
-              <a:rPr lang="en-US"/>
+              <a:rPr lang="en-US" dirty="0">
+                <a:latin typeface="Calibri"/>
+              </a:rPr>
               <a:t> if k2 &lt; 100</a:t>
             </a:r>
           </a:p>
@@ -11693,10 +11932,14 @@
           <a:lstStyle/>
           <a:p>
             <a:r>
-              <a:rPr lang="en-US"/>
+              <a:rPr lang="en-US" dirty="0">
+                <a:latin typeface="Calibri"/>
+              </a:rPr>
               <a:t>3: if j2 &lt; 20</a:t>
             </a:r>
-            <a:endParaRPr lang="en-US" sz="2800"/>
+            <a:endParaRPr lang="en-US" sz="2800" dirty="0">
+              <a:latin typeface="Calibri"/>
+            </a:endParaRPr>
           </a:p>
         </p:txBody>
       </p:sp>
@@ -11712,8 +11955,8 @@
         </p:nvCxnSpPr>
         <p:spPr bwMode="auto">
           <a:xfrm>
-            <a:off x="3475038" y="2168525"/>
-            <a:ext cx="1096962" cy="106363"/>
+            <a:off x="3368797" y="2168099"/>
+            <a:ext cx="1203203" cy="106789"/>
           </a:xfrm>
           <a:prstGeom prst="straightConnector1">
             <a:avLst/>
@@ -11799,7 +12042,9 @@
           <a:lstStyle/>
           <a:p>
             <a:r>
-              <a:rPr lang="en-US"/>
+              <a:rPr lang="en-US" dirty="0">
+                <a:latin typeface="Calibri"/>
+              </a:rPr>
               <a:t>4: return j2</a:t>
             </a:r>
           </a:p>
@@ -11844,13 +12089,17 @@
           <a:lstStyle/>
           <a:p>
             <a:r>
-              <a:rPr lang="en-US"/>
+              <a:rPr lang="en-US" dirty="0">
+                <a:latin typeface="Calibri"/>
+              </a:rPr>
               <a:t>5: j3 := 1</a:t>
             </a:r>
           </a:p>
           <a:p>
             <a:r>
-              <a:rPr lang="en-US"/>
+              <a:rPr lang="en-US" dirty="0">
+                <a:latin typeface="Calibri"/>
+              </a:rPr>
               <a:t>    k3 := k2+1</a:t>
             </a:r>
           </a:p>
@@ -11895,24 +12144,34 @@
           <a:lstStyle/>
           <a:p>
             <a:r>
-              <a:rPr lang="en-US" dirty="0"/>
+              <a:rPr lang="en-US" dirty="0">
+                <a:latin typeface="Calibri"/>
+              </a:rPr>
               <a:t>6</a:t>
             </a:r>
             <a:r>
-              <a:rPr lang="en-US" dirty="0" smtClean="0"/>
+              <a:rPr lang="en-US" dirty="0" smtClean="0">
+                <a:latin typeface="Calibri"/>
+              </a:rPr>
               <a:t>:</a:t>
             </a:r>
           </a:p>
           <a:p>
             <a:r>
-              <a:rPr lang="en-US" dirty="0"/>
+              <a:rPr lang="en-US" dirty="0">
+                <a:latin typeface="Calibri"/>
+              </a:rPr>
               <a:t>    k5 := k2</a:t>
             </a:r>
             <a:r>
-              <a:rPr lang="en-US" dirty="0" smtClean="0"/>
+              <a:rPr lang="en-US" dirty="0" smtClean="0">
+                <a:latin typeface="Calibri"/>
+              </a:rPr>
               <a:t>+1</a:t>
             </a:r>
-            <a:endParaRPr lang="en-US" sz="2800" dirty="0"/>
+            <a:endParaRPr lang="en-US" sz="2800" dirty="0">
+              <a:latin typeface="Calibri"/>
+            </a:endParaRPr>
           </a:p>
         </p:txBody>
       </p:sp>
@@ -11955,23 +12214,28 @@
           <a:lstStyle/>
           <a:p>
             <a:r>
-              <a:rPr lang="en-US" dirty="0"/>
+              <a:rPr lang="en-US" dirty="0">
+                <a:latin typeface="Calibri"/>
+              </a:rPr>
               <a:t>7: j4 := </a:t>
             </a:r>
             <a:r>
               <a:rPr lang="en-US" dirty="0">
+                <a:latin typeface="Calibri"/>
                 <a:sym typeface="Symbol" charset="2"/>
               </a:rPr>
               <a:t></a:t>
             </a:r>
             <a:r>
               <a:rPr lang="en-US" dirty="0" smtClean="0">
+                <a:latin typeface="Calibri"/>
                 <a:sym typeface="Symbol" charset="2"/>
               </a:rPr>
               <a:t>(1, </a:t>
             </a:r>
             <a:r>
               <a:rPr lang="en-US" dirty="0">
+                <a:latin typeface="Calibri"/>
                 <a:sym typeface="Symbol" charset="2"/>
               </a:rPr>
               <a:t>k2)</a:t>
@@ -11979,15 +12243,20 @@
           </a:p>
           <a:p>
             <a:r>
-              <a:rPr lang="en-US" sz="2800" dirty="0"/>
+              <a:rPr lang="en-US" sz="2800" dirty="0">
+                <a:latin typeface="Calibri"/>
+              </a:rPr>
               <a:t>   </a:t>
             </a:r>
             <a:r>
-              <a:rPr lang="en-US" dirty="0"/>
+              <a:rPr lang="en-US" dirty="0">
+                <a:latin typeface="Calibri"/>
+              </a:rPr>
               <a:t>k4 := </a:t>
             </a:r>
             <a:r>
               <a:rPr lang="en-US" dirty="0">
+                <a:latin typeface="Calibri"/>
                 <a:sym typeface="Symbol" charset="2"/>
               </a:rPr>
               <a:t>(k3,k5)</a:t>
@@ -12268,7 +12537,7 @@
         <p:spPr bwMode="auto">
           <a:xfrm>
             <a:off x="1219200" y="1752600"/>
-            <a:ext cx="2255838" cy="831850"/>
+            <a:ext cx="2149597" cy="830997"/>
           </a:xfrm>
           <a:prstGeom prst="rect">
             <a:avLst/>
@@ -12296,16 +12565,22 @@
           <a:lstStyle/>
           <a:p>
             <a:r>
-              <a:rPr lang="en-US"/>
+              <a:rPr lang="en-US" dirty="0">
+                <a:latin typeface="Calibri"/>
+              </a:rPr>
               <a:t>1: i1 := 1  j1 := 1</a:t>
             </a:r>
           </a:p>
           <a:p>
             <a:r>
-              <a:rPr lang="en-US"/>
+              <a:rPr lang="en-US" dirty="0">
+                <a:latin typeface="Calibri"/>
+              </a:rPr>
               <a:t>    k1 := 0</a:t>
             </a:r>
-            <a:endParaRPr lang="en-US" sz="2800"/>
+            <a:endParaRPr lang="en-US" sz="2800" dirty="0">
+              <a:latin typeface="Calibri"/>
+            </a:endParaRPr>
           </a:p>
         </p:txBody>
       </p:sp>
@@ -12348,11 +12623,14 @@
           <a:lstStyle/>
           <a:p>
             <a:r>
-              <a:rPr lang="en-US"/>
+              <a:rPr lang="en-US" dirty="0">
+                <a:latin typeface="Calibri"/>
+              </a:rPr>
               <a:t>2: j2 := </a:t>
             </a:r>
             <a:r>
-              <a:rPr lang="en-US">
+              <a:rPr lang="en-US" dirty="0">
+                <a:latin typeface="Calibri"/>
                 <a:sym typeface="Symbol" charset="2"/>
               </a:rPr>
               <a:t>(j4, 1)</a:t>
@@ -12360,17 +12638,21 @@
           </a:p>
           <a:p>
             <a:r>
-              <a:rPr lang="en-US">
+              <a:rPr lang="en-US" dirty="0">
+                <a:latin typeface="Calibri"/>
                 <a:sym typeface="Symbol" charset="2"/>
               </a:rPr>
               <a:t>    </a:t>
             </a:r>
             <a:r>
-              <a:rPr lang="en-US"/>
+              <a:rPr lang="en-US" dirty="0">
+                <a:latin typeface="Calibri"/>
+              </a:rPr>
               <a:t>k2 := </a:t>
             </a:r>
             <a:r>
-              <a:rPr lang="en-US">
+              <a:rPr lang="en-US" dirty="0">
+                <a:latin typeface="Calibri"/>
                 <a:sym typeface="Symbol" charset="2"/>
               </a:rPr>
               <a:t>(k4, 0)</a:t>
@@ -12378,13 +12660,16 @@
           </a:p>
           <a:p>
             <a:r>
-              <a:rPr lang="en-US">
+              <a:rPr lang="en-US" dirty="0">
+                <a:latin typeface="Calibri"/>
                 <a:sym typeface="Symbol" charset="2"/>
               </a:rPr>
               <a:t>   </a:t>
             </a:r>
             <a:r>
-              <a:rPr lang="en-US"/>
+              <a:rPr lang="en-US" dirty="0">
+                <a:latin typeface="Calibri"/>
+              </a:rPr>
               <a:t> if k2 &lt; 100</a:t>
             </a:r>
           </a:p>
@@ -12429,10 +12714,14 @@
           <a:lstStyle/>
           <a:p>
             <a:r>
-              <a:rPr lang="en-US"/>
+              <a:rPr lang="en-US" dirty="0">
+                <a:latin typeface="Calibri"/>
+              </a:rPr>
               <a:t>3: if j2 &lt; 20</a:t>
             </a:r>
-            <a:endParaRPr lang="en-US" sz="2800"/>
+            <a:endParaRPr lang="en-US" sz="2800" dirty="0">
+              <a:latin typeface="Calibri"/>
+            </a:endParaRPr>
           </a:p>
         </p:txBody>
       </p:sp>
@@ -12448,8 +12737,8 @@
         </p:nvCxnSpPr>
         <p:spPr bwMode="auto">
           <a:xfrm>
-            <a:off x="3475038" y="2168525"/>
-            <a:ext cx="1096962" cy="106363"/>
+            <a:off x="3368797" y="2168099"/>
+            <a:ext cx="1203203" cy="106789"/>
           </a:xfrm>
           <a:prstGeom prst="straightConnector1">
             <a:avLst/>
@@ -12535,7 +12824,9 @@
           <a:lstStyle/>
           <a:p>
             <a:r>
-              <a:rPr lang="en-US"/>
+              <a:rPr lang="en-US" dirty="0">
+                <a:latin typeface="Calibri"/>
+              </a:rPr>
               <a:t>4: return j2</a:t>
             </a:r>
           </a:p>
@@ -12580,13 +12871,17 @@
           <a:lstStyle/>
           <a:p>
             <a:r>
-              <a:rPr lang="en-US"/>
+              <a:rPr lang="en-US" dirty="0">
+                <a:latin typeface="Calibri"/>
+              </a:rPr>
               <a:t>5: j3 := 1</a:t>
             </a:r>
           </a:p>
           <a:p>
             <a:r>
-              <a:rPr lang="en-US"/>
+              <a:rPr lang="en-US" dirty="0">
+                <a:latin typeface="Calibri"/>
+              </a:rPr>
               <a:t>    k3 := k2+1</a:t>
             </a:r>
           </a:p>
@@ -12631,15 +12926,20 @@
           <a:lstStyle/>
           <a:p>
             <a:r>
-              <a:rPr lang="en-US" dirty="0"/>
+              <a:rPr lang="en-US" dirty="0">
+                <a:latin typeface="Calibri"/>
+              </a:rPr>
               <a:t>7: j4 :=</a:t>
             </a:r>
             <a:r>
-              <a:rPr lang="en-US" dirty="0" smtClean="0"/>
+              <a:rPr lang="en-US" dirty="0" smtClean="0">
+                <a:latin typeface="Calibri"/>
+              </a:rPr>
               <a:t> </a:t>
             </a:r>
             <a:r>
               <a:rPr lang="en-US" dirty="0" smtClean="0">
+                <a:latin typeface="Calibri"/>
                 <a:sym typeface="Symbol" charset="2"/>
               </a:rPr>
               <a:t>(1)</a:t>
@@ -12647,26 +12947,33 @@
           </a:p>
           <a:p>
             <a:r>
-              <a:rPr lang="en-US" sz="2800" dirty="0"/>
+              <a:rPr lang="en-US" sz="2800" dirty="0">
+                <a:latin typeface="Calibri"/>
+              </a:rPr>
               <a:t>   </a:t>
             </a:r>
             <a:r>
-              <a:rPr lang="en-US" dirty="0"/>
+              <a:rPr lang="en-US" dirty="0">
+                <a:latin typeface="Calibri"/>
+              </a:rPr>
               <a:t>k4 := </a:t>
             </a:r>
             <a:r>
               <a:rPr lang="en-US" dirty="0">
+                <a:latin typeface="Calibri"/>
                 <a:sym typeface="Symbol" charset="2"/>
               </a:rPr>
               <a:t>(</a:t>
             </a:r>
             <a:r>
               <a:rPr lang="en-US" dirty="0" smtClean="0">
+                <a:latin typeface="Calibri"/>
                 <a:sym typeface="Symbol" charset="2"/>
               </a:rPr>
               <a:t>k3)</a:t>
             </a:r>
             <a:endParaRPr lang="en-US" dirty="0">
+              <a:latin typeface="Calibri"/>
               <a:sym typeface="Symbol" charset="2"/>
             </a:endParaRPr>
           </a:p>
@@ -12885,7 +13192,7 @@
         <p:spPr bwMode="auto">
           <a:xfrm>
             <a:off x="1219200" y="1752600"/>
-            <a:ext cx="2255838" cy="831850"/>
+            <a:ext cx="2149597" cy="830997"/>
           </a:xfrm>
           <a:prstGeom prst="rect">
             <a:avLst/>
@@ -12913,16 +13220,22 @@
           <a:lstStyle/>
           <a:p>
             <a:r>
-              <a:rPr lang="en-US"/>
+              <a:rPr lang="en-US" dirty="0">
+                <a:latin typeface="Calibri"/>
+              </a:rPr>
               <a:t>1: i1 := 1  j1 := 1</a:t>
             </a:r>
           </a:p>
           <a:p>
             <a:r>
-              <a:rPr lang="en-US"/>
+              <a:rPr lang="en-US" dirty="0">
+                <a:latin typeface="Calibri"/>
+              </a:rPr>
               <a:t>    k1 := 0</a:t>
             </a:r>
-            <a:endParaRPr lang="en-US" sz="2800"/>
+            <a:endParaRPr lang="en-US" sz="2800" dirty="0">
+              <a:latin typeface="Calibri"/>
+            </a:endParaRPr>
           </a:p>
         </p:txBody>
       </p:sp>
@@ -12965,23 +13278,28 @@
           <a:lstStyle/>
           <a:p>
             <a:r>
-              <a:rPr lang="en-US" dirty="0"/>
+              <a:rPr lang="en-US" dirty="0">
+                <a:latin typeface="Calibri"/>
+              </a:rPr>
               <a:t>2: j2 := </a:t>
             </a:r>
             <a:r>
               <a:rPr lang="en-US" dirty="0">
+                <a:latin typeface="Calibri"/>
                 <a:sym typeface="Symbol" charset="2"/>
               </a:rPr>
               <a:t></a:t>
             </a:r>
             <a:r>
               <a:rPr lang="en-US" dirty="0" smtClean="0">
+                <a:latin typeface="Calibri"/>
                 <a:sym typeface="Symbol" charset="2"/>
               </a:rPr>
               <a:t>(1, </a:t>
             </a:r>
             <a:r>
               <a:rPr lang="en-US" dirty="0">
+                <a:latin typeface="Calibri"/>
                 <a:sym typeface="Symbol" charset="2"/>
               </a:rPr>
               <a:t>1)</a:t>
@@ -12990,16 +13308,20 @@
           <a:p>
             <a:r>
               <a:rPr lang="en-US" dirty="0">
+                <a:latin typeface="Calibri"/>
                 <a:sym typeface="Symbol" charset="2"/>
               </a:rPr>
               <a:t>    </a:t>
             </a:r>
             <a:r>
-              <a:rPr lang="en-US" dirty="0"/>
+              <a:rPr lang="en-US" dirty="0">
+                <a:latin typeface="Calibri"/>
+              </a:rPr>
               <a:t>k2 := </a:t>
             </a:r>
             <a:r>
               <a:rPr lang="en-US" dirty="0">
+                <a:latin typeface="Calibri"/>
                 <a:sym typeface="Symbol" charset="2"/>
               </a:rPr>
               <a:t>(k4, 0)</a:t>
@@ -13008,12 +13330,15 @@
           <a:p>
             <a:r>
               <a:rPr lang="en-US" dirty="0">
+                <a:latin typeface="Calibri"/>
                 <a:sym typeface="Symbol" charset="2"/>
               </a:rPr>
               <a:t>   </a:t>
             </a:r>
             <a:r>
-              <a:rPr lang="en-US" dirty="0"/>
+              <a:rPr lang="en-US" dirty="0">
+                <a:latin typeface="Calibri"/>
+              </a:rPr>
               <a:t> if k2 &lt; 100</a:t>
             </a:r>
           </a:p>
@@ -13058,10 +13383,14 @@
           <a:lstStyle/>
           <a:p>
             <a:r>
-              <a:rPr lang="en-US"/>
+              <a:rPr lang="en-US" dirty="0">
+                <a:latin typeface="Calibri"/>
+              </a:rPr>
               <a:t>3: if j2 &lt; 20</a:t>
             </a:r>
-            <a:endParaRPr lang="en-US" sz="2800"/>
+            <a:endParaRPr lang="en-US" sz="2800" dirty="0">
+              <a:latin typeface="Calibri"/>
+            </a:endParaRPr>
           </a:p>
         </p:txBody>
       </p:sp>
@@ -13077,8 +13406,8 @@
         </p:nvCxnSpPr>
         <p:spPr bwMode="auto">
           <a:xfrm>
-            <a:off x="3475038" y="2168525"/>
-            <a:ext cx="1096962" cy="106363"/>
+            <a:off x="3368797" y="2168099"/>
+            <a:ext cx="1203203" cy="106789"/>
           </a:xfrm>
           <a:prstGeom prst="straightConnector1">
             <a:avLst/>
@@ -13164,7 +13493,9 @@
           <a:lstStyle/>
           <a:p>
             <a:r>
-              <a:rPr lang="en-US"/>
+              <a:rPr lang="en-US" dirty="0">
+                <a:latin typeface="Calibri"/>
+              </a:rPr>
               <a:t>4: return j2</a:t>
             </a:r>
           </a:p>
@@ -13209,13 +13540,17 @@
           <a:lstStyle/>
           <a:p>
             <a:r>
-              <a:rPr lang="en-US"/>
+              <a:rPr lang="en-US" dirty="0">
+                <a:latin typeface="Calibri"/>
+              </a:rPr>
               <a:t>5: j3 := 1</a:t>
             </a:r>
           </a:p>
           <a:p>
             <a:r>
-              <a:rPr lang="en-US"/>
+              <a:rPr lang="en-US" dirty="0">
+                <a:latin typeface="Calibri"/>
+              </a:rPr>
               <a:t>    k3 := k2+1</a:t>
             </a:r>
           </a:p>
@@ -13260,39 +13595,51 @@
           <a:lstStyle/>
           <a:p>
             <a:r>
-              <a:rPr lang="en-US" dirty="0"/>
+              <a:rPr lang="en-US" dirty="0">
+                <a:latin typeface="Calibri"/>
+              </a:rPr>
               <a:t>7</a:t>
             </a:r>
             <a:r>
-              <a:rPr lang="en-US" dirty="0" smtClean="0"/>
+              <a:rPr lang="en-US" dirty="0" smtClean="0">
+                <a:latin typeface="Calibri"/>
+              </a:rPr>
               <a:t>:</a:t>
             </a:r>
             <a:endParaRPr lang="en-US" dirty="0" smtClean="0">
+              <a:latin typeface="Calibri"/>
               <a:sym typeface="Symbol" charset="2"/>
             </a:endParaRPr>
           </a:p>
           <a:p>
             <a:r>
-              <a:rPr lang="en-US" sz="2800" dirty="0" smtClean="0"/>
+              <a:rPr lang="en-US" sz="2800" dirty="0" smtClean="0">
+                <a:latin typeface="Calibri"/>
+              </a:rPr>
               <a:t>   </a:t>
             </a:r>
             <a:r>
-              <a:rPr lang="en-US" dirty="0"/>
+              <a:rPr lang="en-US" dirty="0">
+                <a:latin typeface="Calibri"/>
+              </a:rPr>
               <a:t>k4 := </a:t>
             </a:r>
             <a:r>
               <a:rPr lang="en-US" dirty="0">
+                <a:latin typeface="Calibri"/>
                 <a:sym typeface="Symbol" charset="2"/>
               </a:rPr>
               <a:t>(</a:t>
             </a:r>
             <a:r>
               <a:rPr lang="en-US" dirty="0" smtClean="0">
+                <a:latin typeface="Calibri"/>
                 <a:sym typeface="Symbol" charset="2"/>
               </a:rPr>
               <a:t>k3)</a:t>
             </a:r>
             <a:endParaRPr lang="en-US" dirty="0">
+              <a:latin typeface="Calibri"/>
               <a:sym typeface="Symbol" charset="2"/>
             </a:endParaRPr>
           </a:p>
@@ -13511,7 +13858,7 @@
         <p:spPr bwMode="auto">
           <a:xfrm>
             <a:off x="1219200" y="1752600"/>
-            <a:ext cx="2255838" cy="831850"/>
+            <a:ext cx="2149597" cy="830997"/>
           </a:xfrm>
           <a:prstGeom prst="rect">
             <a:avLst/>
@@ -13539,16 +13886,22 @@
           <a:lstStyle/>
           <a:p>
             <a:r>
-              <a:rPr lang="en-US"/>
+              <a:rPr lang="en-US" dirty="0">
+                <a:latin typeface="Calibri"/>
+              </a:rPr>
               <a:t>1: i1 := 1  j1 := 1</a:t>
             </a:r>
           </a:p>
           <a:p>
             <a:r>
-              <a:rPr lang="en-US"/>
+              <a:rPr lang="en-US" dirty="0">
+                <a:latin typeface="Calibri"/>
+              </a:rPr>
               <a:t>    k1 := 0</a:t>
             </a:r>
-            <a:endParaRPr lang="en-US" sz="2800"/>
+            <a:endParaRPr lang="en-US" sz="2800" dirty="0">
+              <a:latin typeface="Calibri"/>
+            </a:endParaRPr>
           </a:p>
         </p:txBody>
       </p:sp>
@@ -13591,30 +13944,39 @@
           <a:lstStyle/>
           <a:p>
             <a:r>
-              <a:rPr lang="en-US" dirty="0"/>
+              <a:rPr lang="en-US" dirty="0">
+                <a:latin typeface="Calibri"/>
+              </a:rPr>
               <a:t>2</a:t>
             </a:r>
             <a:r>
-              <a:rPr lang="en-US" dirty="0" smtClean="0"/>
+              <a:rPr lang="en-US" dirty="0" smtClean="0">
+                <a:latin typeface="Calibri"/>
+              </a:rPr>
               <a:t>:</a:t>
             </a:r>
             <a:endParaRPr lang="en-US" dirty="0" smtClean="0">
+              <a:latin typeface="Calibri"/>
               <a:sym typeface="Symbol" charset="2"/>
             </a:endParaRPr>
           </a:p>
           <a:p>
             <a:r>
               <a:rPr lang="en-US" dirty="0">
+                <a:latin typeface="Calibri"/>
                 <a:sym typeface="Symbol" charset="2"/>
               </a:rPr>
               <a:t>    </a:t>
             </a:r>
             <a:r>
-              <a:rPr lang="en-US" dirty="0"/>
+              <a:rPr lang="en-US" dirty="0">
+                <a:latin typeface="Calibri"/>
+              </a:rPr>
               <a:t>k2 := </a:t>
             </a:r>
             <a:r>
               <a:rPr lang="en-US" dirty="0">
+                <a:latin typeface="Calibri"/>
                 <a:sym typeface="Symbol" charset="2"/>
               </a:rPr>
               <a:t>(k4, 0)</a:t>
@@ -13623,12 +13985,15 @@
           <a:p>
             <a:r>
               <a:rPr lang="en-US" dirty="0">
+                <a:latin typeface="Calibri"/>
                 <a:sym typeface="Symbol" charset="2"/>
               </a:rPr>
               <a:t>   </a:t>
             </a:r>
             <a:r>
-              <a:rPr lang="en-US" dirty="0"/>
+              <a:rPr lang="en-US" dirty="0">
+                <a:latin typeface="Calibri"/>
+              </a:rPr>
               <a:t> if k2 &lt; 100</a:t>
             </a:r>
           </a:p>
@@ -13673,18 +14038,26 @@
           <a:lstStyle/>
           <a:p>
             <a:r>
-              <a:rPr lang="en-US" dirty="0"/>
+              <a:rPr lang="en-US" dirty="0">
+                <a:latin typeface="Calibri"/>
+              </a:rPr>
               <a:t>3: if</a:t>
             </a:r>
             <a:r>
-              <a:rPr lang="en-US" dirty="0" smtClean="0"/>
+              <a:rPr lang="en-US" dirty="0" smtClean="0">
+                <a:latin typeface="Calibri"/>
+              </a:rPr>
               <a:t> 1 &lt; </a:t>
             </a:r>
             <a:r>
-              <a:rPr lang="en-US" dirty="0"/>
+              <a:rPr lang="en-US" dirty="0">
+                <a:latin typeface="Calibri"/>
+              </a:rPr>
               <a:t>20</a:t>
             </a:r>
-            <a:endParaRPr lang="en-US" sz="2800" dirty="0"/>
+            <a:endParaRPr lang="en-US" sz="2800" dirty="0">
+              <a:latin typeface="Calibri"/>
+            </a:endParaRPr>
           </a:p>
         </p:txBody>
       </p:sp>
@@ -13700,8 +14073,8 @@
         </p:nvCxnSpPr>
         <p:spPr bwMode="auto">
           <a:xfrm>
-            <a:off x="3475038" y="2168525"/>
-            <a:ext cx="1096962" cy="106363"/>
+            <a:off x="3368797" y="2168099"/>
+            <a:ext cx="1203203" cy="106789"/>
           </a:xfrm>
           <a:prstGeom prst="straightConnector1">
             <a:avLst/>
@@ -13787,14 +14160,20 @@
           <a:lstStyle/>
           <a:p>
             <a:r>
-              <a:rPr lang="en-US" dirty="0"/>
+              <a:rPr lang="en-US" dirty="0">
+                <a:latin typeface="Calibri"/>
+              </a:rPr>
               <a:t>4: return</a:t>
             </a:r>
             <a:r>
-              <a:rPr lang="en-US" dirty="0" smtClean="0"/>
+              <a:rPr lang="en-US" dirty="0" smtClean="0">
+                <a:latin typeface="Calibri"/>
+              </a:rPr>
               <a:t> 1</a:t>
             </a:r>
-            <a:endParaRPr lang="en-US" dirty="0"/>
+            <a:endParaRPr lang="en-US" dirty="0">
+              <a:latin typeface="Calibri"/>
+            </a:endParaRPr>
           </a:p>
         </p:txBody>
       </p:sp>
@@ -13837,17 +14216,23 @@
           <a:lstStyle/>
           <a:p>
             <a:r>
-              <a:rPr lang="en-US" dirty="0"/>
+              <a:rPr lang="en-US" dirty="0">
+                <a:latin typeface="Calibri"/>
+              </a:rPr>
               <a:t>5:</a:t>
             </a:r>
             <a:r>
-              <a:rPr lang="en-US" dirty="0" smtClean="0"/>
+              <a:rPr lang="en-US" dirty="0" smtClean="0">
+                <a:latin typeface="Calibri"/>
+              </a:rPr>
               <a:t> </a:t>
             </a:r>
           </a:p>
           <a:p>
             <a:r>
-              <a:rPr lang="en-US" dirty="0"/>
+              <a:rPr lang="en-US" dirty="0">
+                <a:latin typeface="Calibri"/>
+              </a:rPr>
               <a:t>    k3 := k2+1</a:t>
             </a:r>
           </a:p>
@@ -13892,39 +14277,51 @@
           <a:lstStyle/>
           <a:p>
             <a:r>
-              <a:rPr lang="en-US" dirty="0"/>
+              <a:rPr lang="en-US" dirty="0">
+                <a:latin typeface="Calibri"/>
+              </a:rPr>
               <a:t>7</a:t>
             </a:r>
             <a:r>
-              <a:rPr lang="en-US" dirty="0" smtClean="0"/>
+              <a:rPr lang="en-US" dirty="0" smtClean="0">
+                <a:latin typeface="Calibri"/>
+              </a:rPr>
               <a:t>:</a:t>
             </a:r>
             <a:endParaRPr lang="en-US" dirty="0" smtClean="0">
+              <a:latin typeface="Calibri"/>
               <a:sym typeface="Symbol" charset="2"/>
             </a:endParaRPr>
           </a:p>
           <a:p>
             <a:r>
-              <a:rPr lang="en-US" sz="2800" dirty="0" smtClean="0"/>
+              <a:rPr lang="en-US" sz="2800" dirty="0" smtClean="0">
+                <a:latin typeface="Calibri"/>
+              </a:rPr>
               <a:t>   </a:t>
             </a:r>
             <a:r>
-              <a:rPr lang="en-US" dirty="0"/>
+              <a:rPr lang="en-US" dirty="0">
+                <a:latin typeface="Calibri"/>
+              </a:rPr>
               <a:t>k4 := </a:t>
             </a:r>
             <a:r>
               <a:rPr lang="en-US" dirty="0">
+                <a:latin typeface="Calibri"/>
                 <a:sym typeface="Symbol" charset="2"/>
               </a:rPr>
               <a:t>(</a:t>
             </a:r>
             <a:r>
               <a:rPr lang="en-US" dirty="0" smtClean="0">
+                <a:latin typeface="Calibri"/>
                 <a:sym typeface="Symbol" charset="2"/>
               </a:rPr>
               <a:t>k3)</a:t>
             </a:r>
             <a:endParaRPr lang="en-US" dirty="0">
+              <a:latin typeface="Calibri"/>
               <a:sym typeface="Symbol" charset="2"/>
             </a:endParaRPr>
           </a:p>
@@ -14171,10 +14568,14 @@
           <a:lstStyle/>
           <a:p>
             <a:r>
-              <a:rPr lang="en-US"/>
+              <a:rPr lang="en-US" dirty="0">
+                <a:latin typeface="Calibri"/>
+              </a:rPr>
               <a:t>1:</a:t>
             </a:r>
-            <a:endParaRPr lang="en-US" sz="2800"/>
+            <a:endParaRPr lang="en-US" sz="2800" dirty="0">
+              <a:latin typeface="Calibri"/>
+            </a:endParaRPr>
           </a:p>
         </p:txBody>
       </p:sp>
@@ -14217,11 +14618,14 @@
           <a:lstStyle/>
           <a:p>
             <a:r>
-              <a:rPr lang="en-US"/>
+              <a:rPr lang="en-US" dirty="0">
+                <a:latin typeface="Calibri"/>
+              </a:rPr>
               <a:t>2: k2 := </a:t>
             </a:r>
             <a:r>
-              <a:rPr lang="en-US">
+              <a:rPr lang="en-US" dirty="0">
+                <a:latin typeface="Calibri"/>
                 <a:sym typeface="Symbol" charset="2"/>
               </a:rPr>
               <a:t>(k4, 0)</a:t>
@@ -14229,13 +14633,16 @@
           </a:p>
           <a:p>
             <a:r>
-              <a:rPr lang="en-US">
+              <a:rPr lang="en-US" dirty="0">
+                <a:latin typeface="Calibri"/>
                 <a:sym typeface="Symbol" charset="2"/>
               </a:rPr>
               <a:t>   </a:t>
             </a:r>
             <a:r>
-              <a:rPr lang="en-US"/>
+              <a:rPr lang="en-US" dirty="0">
+                <a:latin typeface="Calibri"/>
+              </a:rPr>
               <a:t> if k2 &lt; 100</a:t>
             </a:r>
           </a:p>
@@ -14280,10 +14687,14 @@
           <a:lstStyle/>
           <a:p>
             <a:r>
-              <a:rPr lang="en-US"/>
+              <a:rPr lang="en-US" dirty="0">
+                <a:latin typeface="Calibri"/>
+              </a:rPr>
               <a:t>3:</a:t>
             </a:r>
-            <a:endParaRPr lang="en-US" sz="2800"/>
+            <a:endParaRPr lang="en-US" sz="2800" dirty="0">
+              <a:latin typeface="Calibri"/>
+            </a:endParaRPr>
           </a:p>
         </p:txBody>
       </p:sp>
@@ -14386,7 +14797,9 @@
           <a:lstStyle/>
           <a:p>
             <a:r>
-              <a:rPr lang="en-US"/>
+              <a:rPr lang="en-US" dirty="0">
+                <a:latin typeface="Calibri"/>
+              </a:rPr>
               <a:t>4: return 1</a:t>
             </a:r>
           </a:p>
@@ -14431,7 +14844,9 @@
           <a:lstStyle/>
           <a:p>
             <a:r>
-              <a:rPr lang="en-US"/>
+              <a:rPr lang="en-US" dirty="0">
+                <a:latin typeface="Calibri"/>
+              </a:rPr>
               <a:t>5: k3 := k2+1</a:t>
             </a:r>
           </a:p>
@@ -14476,11 +14891,14 @@
           <a:lstStyle/>
           <a:p>
             <a:r>
-              <a:rPr lang="en-US"/>
+              <a:rPr lang="en-US" dirty="0">
+                <a:latin typeface="Calibri"/>
+              </a:rPr>
               <a:t>7: k4 := </a:t>
             </a:r>
             <a:r>
-              <a:rPr lang="en-US">
+              <a:rPr lang="en-US" dirty="0">
+                <a:latin typeface="Calibri"/>
                 <a:sym typeface="Symbol" charset="2"/>
               </a:rPr>
               <a:t>(k3)</a:t>
@@ -14729,10 +15147,14 @@
           <a:lstStyle/>
           <a:p>
             <a:r>
-              <a:rPr lang="en-US"/>
+              <a:rPr lang="en-US" dirty="0">
+                <a:latin typeface="Calibri"/>
+              </a:rPr>
               <a:t>1:</a:t>
             </a:r>
-            <a:endParaRPr lang="en-US" sz="2800"/>
+            <a:endParaRPr lang="en-US" sz="2800" dirty="0">
+              <a:latin typeface="Calibri"/>
+            </a:endParaRPr>
           </a:p>
         </p:txBody>
       </p:sp>
@@ -14775,11 +15197,14 @@
           <a:lstStyle/>
           <a:p>
             <a:r>
-              <a:rPr lang="en-US"/>
+              <a:rPr lang="en-US" dirty="0">
+                <a:latin typeface="Calibri"/>
+              </a:rPr>
               <a:t>2: k2 := </a:t>
             </a:r>
             <a:r>
-              <a:rPr lang="en-US">
+              <a:rPr lang="en-US" dirty="0">
+                <a:latin typeface="Calibri"/>
                 <a:sym typeface="Symbol" charset="2"/>
               </a:rPr>
               <a:t>(k3, 0)</a:t>
@@ -14787,13 +15212,16 @@
           </a:p>
           <a:p>
             <a:r>
-              <a:rPr lang="en-US">
+              <a:rPr lang="en-US" dirty="0">
+                <a:latin typeface="Calibri"/>
                 <a:sym typeface="Symbol" charset="2"/>
               </a:rPr>
               <a:t>   </a:t>
             </a:r>
             <a:r>
-              <a:rPr lang="en-US"/>
+              <a:rPr lang="en-US" dirty="0">
+                <a:latin typeface="Calibri"/>
+              </a:rPr>
               <a:t> if k2 &lt; 100</a:t>
             </a:r>
           </a:p>
@@ -14898,7 +15326,9 @@
           <a:lstStyle/>
           <a:p>
             <a:r>
-              <a:rPr lang="en-US"/>
+              <a:rPr lang="en-US" dirty="0">
+                <a:latin typeface="Calibri"/>
+              </a:rPr>
               <a:t>4: return 1</a:t>
             </a:r>
           </a:p>
@@ -14943,7 +15373,9 @@
           <a:lstStyle/>
           <a:p>
             <a:r>
-              <a:rPr lang="en-US"/>
+              <a:rPr lang="en-US" dirty="0">
+                <a:latin typeface="Calibri"/>
+              </a:rPr>
               <a:t>5: k3 := k2+1</a:t>
             </a:r>
           </a:p>
@@ -15873,18 +16305,26 @@
               <a:buChar char="•"/>
             </a:pPr>
             <a:r>
-              <a:rPr lang="en-US" sz="2800" i="1" dirty="0"/>
+              <a:rPr lang="en-US" sz="2800" i="1" dirty="0">
+                <a:latin typeface="Calibri"/>
+              </a:rPr>
               <a:t>Advanced Compiler Design and Implementation</a:t>
             </a:r>
             <a:r>
-              <a:rPr lang="en-US" sz="2800" dirty="0"/>
+              <a:rPr lang="en-US" sz="2800" dirty="0">
+                <a:latin typeface="Calibri"/>
+              </a:rPr>
               <a:t> by Steven S. </a:t>
             </a:r>
             <a:r>
-              <a:rPr lang="en-US" sz="2800" dirty="0" err="1"/>
+              <a:rPr lang="en-US" sz="2800" dirty="0" err="1">
+                <a:latin typeface="Calibri"/>
+              </a:rPr>
               <a:t>Muchnick</a:t>
             </a:r>
-            <a:endParaRPr lang="en-US" sz="3200" dirty="0"/>
+            <a:endParaRPr lang="en-US" sz="3200" dirty="0">
+              <a:latin typeface="Calibri"/>
+            </a:endParaRPr>
           </a:p>
         </p:txBody>
       </p:sp>
@@ -16527,7 +16967,7 @@
         <p:spPr bwMode="auto">
           <a:xfrm>
             <a:off x="1371600" y="5638800"/>
-            <a:ext cx="6040438" cy="579438"/>
+            <a:ext cx="6118782" cy="584776"/>
           </a:xfrm>
           <a:prstGeom prst="rect">
             <a:avLst/>
@@ -16552,10 +16992,11 @@
           <a:p>
             <a:pPr eaLnBrk="1" hangingPunct="1"/>
             <a:r>
-              <a:rPr lang="en-US" sz="3200">
+              <a:rPr lang="en-US" sz="3200" dirty="0">
                 <a:solidFill>
                   <a:srgbClr val="990000"/>
                 </a:solidFill>
+                <a:latin typeface="Calibri"/>
               </a:rPr>
               <a:t>Which version of check runs faster?</a:t>
             </a:r>
@@ -17339,19 +17780,27 @@
           <a:p>
             <a:pPr algn="ctr"/>
             <a:r>
-              <a:rPr lang="en-US" b="1"/>
+              <a:rPr lang="en-US" b="1" dirty="0">
+                <a:latin typeface="Calibri"/>
+              </a:rPr>
               <a:t>branch delay</a:t>
             </a:r>
             <a:r>
-              <a:rPr lang="en-US"/>
+              <a:rPr lang="en-US" dirty="0">
+                <a:latin typeface="Calibri"/>
+              </a:rPr>
               <a:t> slot (cf. </a:t>
             </a:r>
             <a:r>
-              <a:rPr lang="en-US" b="1"/>
+              <a:rPr lang="en-US" b="1" dirty="0">
+                <a:latin typeface="Calibri"/>
+              </a:rPr>
               <a:t>load delay</a:t>
             </a:r>
             <a:r>
-              <a:rPr lang="en-US"/>
+              <a:rPr lang="en-US" dirty="0">
+                <a:latin typeface="Calibri"/>
+              </a:rPr>
               <a:t> slot)</a:t>
             </a:r>
           </a:p>
@@ -17743,7 +18192,7 @@
               </a:lnSpc>
             </a:pPr>
             <a:r>
-              <a:rPr lang="en-US"/>
+              <a:rPr lang="en-US" dirty="0"/>
               <a:t>Flow control optimization</a:t>
             </a:r>
           </a:p>
@@ -17756,9 +18205,14 @@
               <a:buNone/>
             </a:pPr>
             <a:r>
-              <a:rPr lang="en-US"/>
-              <a:t>goto L1</a:t>
-            </a:r>
+              <a:rPr lang="en-US" dirty="0" err="1" smtClean="0"/>
+              <a:t>br</a:t>
+            </a:r>
+            <a:r>
+              <a:rPr lang="en-US" dirty="0" smtClean="0"/>
+              <a:t> L1</a:t>
+            </a:r>
+            <a:endParaRPr lang="en-US" dirty="0"/>
           </a:p>
           <a:p>
             <a:pPr lvl="1">
@@ -17769,9 +18223,22 @@
               <a:buNone/>
             </a:pPr>
             <a:r>
-              <a:rPr lang="en-US"/>
-              <a:t>L1: goto L2</a:t>
-            </a:r>
+              <a:rPr lang="en-US" dirty="0"/>
+              <a:t>L1: </a:t>
+            </a:r>
+            <a:r>
+              <a:rPr lang="en-US" dirty="0" err="1" smtClean="0"/>
+              <a:t>br</a:t>
+            </a:r>
+            <a:r>
+              <a:rPr lang="en-US" dirty="0" smtClean="0"/>
+              <a:t> </a:t>
+            </a:r>
+            <a:r>
+              <a:rPr lang="en-US" dirty="0" smtClean="0"/>
+              <a:t>L2</a:t>
+            </a:r>
+            <a:endParaRPr lang="en-US" dirty="0"/>
           </a:p>
           <a:p>
             <a:pPr>
@@ -17780,7 +18247,7 @@
               </a:lnSpc>
             </a:pPr>
             <a:r>
-              <a:rPr lang="en-US"/>
+              <a:rPr lang="en-US" dirty="0"/>
               <a:t>Algebraic simplification</a:t>
             </a:r>
           </a:p>
@@ -17791,7 +18258,7 @@
               </a:lnSpc>
             </a:pPr>
             <a:r>
-              <a:rPr lang="en-US"/>
+              <a:rPr lang="en-US" dirty="0"/>
               <a:t>Reduction in strength</a:t>
             </a:r>
           </a:p>
@@ -17802,7 +18269,7 @@
               </a:lnSpc>
             </a:pPr>
             <a:r>
-              <a:rPr lang="en-US"/>
+              <a:rPr lang="en-US" dirty="0"/>
               <a:t>Use faster instructions whenever possible</a:t>
             </a:r>
           </a:p>
@@ -17813,7 +18280,7 @@
               </a:lnSpc>
             </a:pPr>
             <a:r>
-              <a:rPr lang="en-US"/>
+              <a:rPr lang="en-US" dirty="0"/>
               <a:t>Use of Machine Idioms</a:t>
             </a:r>
           </a:p>
@@ -17824,7 +18291,7 @@
               </a:lnSpc>
             </a:pPr>
             <a:r>
-              <a:rPr lang="en-US"/>
+              <a:rPr lang="en-US" dirty="0"/>
               <a:t>Filling delay slots</a:t>
             </a:r>
           </a:p>

</xml_diff>

<commit_message>
clean up types slides
</commit_message>
<xml_diff>
--- a/assets/ppt/opt/opt.pptx
+++ b/assets/ppt/opt/opt.pptx
@@ -18020,7 +18020,7 @@
               </a:lnSpc>
             </a:pPr>
             <a:r>
-              <a:rPr lang="en-US"/>
+              <a:rPr lang="en-US" dirty="0"/>
               <a:t>Redundant instruction elimination</a:t>
             </a:r>
           </a:p>
@@ -18031,15 +18031,15 @@
               </a:lnSpc>
             </a:pPr>
             <a:r>
-              <a:rPr lang="en-US"/>
+              <a:rPr lang="en-US" dirty="0"/>
               <a:t>If two instructions perform that same function </a:t>
             </a:r>
             <a:r>
-              <a:rPr lang="en-US" b="1" i="1"/>
+              <a:rPr lang="en-US" b="1" i="1" dirty="0"/>
               <a:t>and</a:t>
             </a:r>
             <a:r>
-              <a:rPr lang="en-US"/>
+              <a:rPr lang="en-US" dirty="0"/>
               <a:t> are in the same basic block, remove one</a:t>
             </a:r>
           </a:p>
@@ -18050,7 +18050,7 @@
               </a:lnSpc>
             </a:pPr>
             <a:r>
-              <a:rPr lang="en-US"/>
+              <a:rPr lang="en-US" dirty="0"/>
               <a:t>Redundant loads and stores</a:t>
             </a:r>
           </a:p>
@@ -18063,7 +18063,7 @@
               <a:buNone/>
             </a:pPr>
             <a:r>
-              <a:rPr lang="en-US"/>
+              <a:rPr lang="en-US" dirty="0"/>
               <a:t>li $t0, 3</a:t>
             </a:r>
           </a:p>
@@ -18076,7 +18076,7 @@
               <a:buNone/>
             </a:pPr>
             <a:r>
-              <a:rPr lang="en-US"/>
+              <a:rPr lang="en-US" dirty="0"/>
               <a:t>li $t0, 4</a:t>
             </a:r>
           </a:p>
@@ -18087,7 +18087,7 @@
               </a:lnSpc>
             </a:pPr>
             <a:r>
-              <a:rPr lang="en-US"/>
+              <a:rPr lang="en-US" dirty="0"/>
               <a:t>Remove unreachable code</a:t>
             </a:r>
           </a:p>
@@ -18100,7 +18100,7 @@
               <a:buNone/>
             </a:pPr>
             <a:r>
-              <a:rPr lang="en-US"/>
+              <a:rPr lang="en-US" dirty="0"/>
               <a:t>li $t0, 3</a:t>
             </a:r>
           </a:p>
@@ -18113,9 +18113,14 @@
               <a:buNone/>
             </a:pPr>
             <a:r>
-              <a:rPr lang="en-US"/>
-              <a:t>goto L2</a:t>
-            </a:r>
+              <a:rPr lang="en-US" dirty="0" err="1" smtClean="0"/>
+              <a:t>br</a:t>
+            </a:r>
+            <a:r>
+              <a:rPr lang="en-US" smtClean="0"/>
+              <a:t> L2</a:t>
+            </a:r>
+            <a:endParaRPr lang="en-US" dirty="0"/>
           </a:p>
           <a:p>
             <a:pPr lvl="2">
@@ -18126,7 +18131,7 @@
               <a:buNone/>
             </a:pPr>
             <a:r>
-              <a:rPr lang="en-US"/>
+              <a:rPr lang="en-US" dirty="0"/>
               <a:t>... (all of this code until next label can be removed)</a:t>
             </a:r>
           </a:p>
@@ -18271,11 +18276,7 @@
             </a:r>
             <a:r>
               <a:rPr lang="en-US" dirty="0" smtClean="0"/>
-              <a:t> </a:t>
-            </a:r>
-            <a:r>
-              <a:rPr lang="en-US" dirty="0" smtClean="0"/>
-              <a:t>L2</a:t>
+              <a:t> L2</a:t>
             </a:r>
             <a:endParaRPr lang="en-US" dirty="0"/>
           </a:p>

</xml_diff>